<commit_message>
Add a slide on imaging
</commit_message>
<xml_diff>
--- a/ESS_May_2021/Thursday_May_6th/2_Samples_II/More_samples.pptx
+++ b/ESS_May_2021/Thursday_May_6th/2_Samples_II/More_samples.pptx
@@ -26,6 +26,8 @@
     <p:sldId id="271" r:id="rId23"/>
     <p:sldId id="272" r:id="rId24"/>
     <p:sldId id="273" r:id="rId25"/>
+    <p:sldId id="274" r:id="rId26"/>
+    <p:sldId id="275" r:id="rId27"/>
   </p:sldIdLst>
   <p:sldSz cx="12179300" cy="6858000"/>
   <p:notesSz cx="6858000" cy="9144000"/>
@@ -17378,7 +17380,7 @@
               <a:defRPr sz="4100"/>
             </a:pPr>
             <a:r>
-              <a:t>SANS, reflectometry, inelastic scattering</a:t>
+              <a:t>SANS, reflectometry, imaging, inelastic scattering</a:t>
             </a:r>
           </a:p>
         </p:txBody>
@@ -17435,56 +17437,6 @@
           <a:p>
             <a:pPr/>
             <a:fld id="{86CB4B4D-7CA3-9044-876B-883B54F8677D}" type="slidenum"/>
-          </a:p>
-        </p:txBody>
-      </p:sp>
-      <p:sp>
-        <p:nvSpPr>
-          <p:cNvPr id="291" name="Subtitle 4"/>
-          <p:cNvSpPr txBox="1"/>
-          <p:nvPr/>
-        </p:nvSpPr>
-        <p:spPr>
-          <a:xfrm>
-            <a:off x="4956574" y="4844643"/>
-            <a:ext cx="10840031" cy="1660657"/>
-          </a:xfrm>
-          <a:prstGeom prst="rect">
-            <a:avLst/>
-          </a:prstGeom>
-          <a:ln w="12700">
-            <a:miter lim="400000"/>
-          </a:ln>
-          <a:extLst>
-            <a:ext uri="{C572A759-6A51-4108-AA02-DFA0A04FC94B}">
-              <ma14:wrappingTextBoxFlag xmlns:ma14="http://schemas.microsoft.com/office/mac/drawingml/2011/main" val="1"/>
-            </a:ext>
-          </a:extLst>
-        </p:spPr>
-        <p:txBody>
-          <a:bodyPr lIns="0" tIns="0" rIns="0" bIns="0" anchor="b">
-            <a:normAutofit fontScale="100000" lnSpcReduction="0"/>
-          </a:bodyPr>
-          <a:lstStyle>
-            <a:lvl1pPr>
-              <a:lnSpc>
-                <a:spcPct val="110000"/>
-              </a:lnSpc>
-              <a:spcBef>
-                <a:spcPts val="0"/>
-              </a:spcBef>
-              <a:defRPr sz="2000">
-                <a:solidFill>
-                  <a:srgbClr val="FFFFFF"/>
-                </a:solidFill>
-              </a:defRPr>
-            </a:lvl1pPr>
-          </a:lstStyle>
-          <a:p>
-            <a:pPr/>
-            <a:r>
-              <a:t>Slides adapted from Mads Bertelsen, ESS DMSC</a:t>
-            </a:r>
           </a:p>
         </p:txBody>
       </p:sp>
@@ -17516,56 +17468,7 @@
       </p:grpSpPr>
       <p:sp>
         <p:nvSpPr>
-          <p:cNvPr id="340" name="McStas samples with inelastic options"/>
-          <p:cNvSpPr txBox="1"/>
-          <p:nvPr>
-            <p:ph type="title"/>
-          </p:nvPr>
-        </p:nvSpPr>
-        <p:spPr>
-          <a:xfrm>
-            <a:off x="2337250" y="-243692"/>
-            <a:ext cx="9312375" cy="795814"/>
-          </a:xfrm>
-          <a:prstGeom prst="rect">
-            <a:avLst/>
-          </a:prstGeom>
-        </p:spPr>
-        <p:txBody>
-          <a:bodyPr/>
-          <a:lstStyle/>
-          <a:p>
-            <a:pPr/>
-            <a:r>
-              <a:t>McStas samples with inelastic options</a:t>
-            </a:r>
-          </a:p>
-        </p:txBody>
-      </p:sp>
-      <p:sp>
-        <p:nvSpPr>
-          <p:cNvPr id="341" name="Double-click to edit"/>
-          <p:cNvSpPr txBox="1"/>
-          <p:nvPr>
-            <p:ph type="body" idx="1"/>
-          </p:nvPr>
-        </p:nvSpPr>
-        <p:spPr>
-          <a:prstGeom prst="rect">
-            <a:avLst/>
-          </a:prstGeom>
-        </p:spPr>
-        <p:txBody>
-          <a:bodyPr/>
-          <a:lstStyle/>
-          <a:p>
-            <a:pPr/>
-          </a:p>
-        </p:txBody>
-      </p:sp>
-      <p:sp>
-        <p:nvSpPr>
-          <p:cNvPr id="342" name="Slide Number"/>
+          <p:cNvPr id="353" name="Slide Number"/>
           <p:cNvSpPr txBox="1"/>
           <p:nvPr>
             <p:ph type="sldNum" sz="quarter" idx="2"/>
@@ -17590,9 +17493,957 @@
           </a:p>
         </p:txBody>
       </p:sp>
+      <p:sp>
+        <p:nvSpPr>
+          <p:cNvPr id="354" name="CustomShape 1"/>
+          <p:cNvSpPr txBox="1"/>
+          <p:nvPr/>
+        </p:nvSpPr>
+        <p:spPr>
+          <a:xfrm>
+            <a:off x="1721308" y="411648"/>
+            <a:ext cx="8332982" cy="851137"/>
+          </a:xfrm>
+          <a:prstGeom prst="rect">
+            <a:avLst/>
+          </a:prstGeom>
+          <a:ln w="12700">
+            <a:miter lim="400000"/>
+          </a:ln>
+          <a:extLst>
+            <a:ext uri="{C572A759-6A51-4108-AA02-DFA0A04FC94B}">
+              <ma14:wrappingTextBoxFlag xmlns:ma14="http://schemas.microsoft.com/office/mac/drawingml/2011/main" val="1"/>
+            </a:ext>
+          </a:extLst>
+        </p:spPr>
+        <p:txBody>
+          <a:bodyPr lIns="0" tIns="0" rIns="0" bIns="0">
+            <a:spAutoFit/>
+          </a:bodyPr>
+          <a:lstStyle/>
+          <a:p>
+            <a:pPr>
+              <a:defRPr spc="0" sz="3000"/>
+            </a:pPr>
+            <a:r>
+              <a:t>Absorption Imaging - simple shapes or OFF’s of</a:t>
+            </a:r>
+            <a:br/>
+            <a:r>
+              <a:t>single-phase material blocks</a:t>
+            </a:r>
+          </a:p>
+        </p:txBody>
+      </p:sp>
+      <p:sp>
+        <p:nvSpPr>
+          <p:cNvPr id="355" name="CustomShape 2"/>
+          <p:cNvSpPr txBox="1"/>
+          <p:nvPr/>
+        </p:nvSpPr>
+        <p:spPr>
+          <a:xfrm>
+            <a:off x="1717762" y="1354772"/>
+            <a:ext cx="8139389" cy="1050824"/>
+          </a:xfrm>
+          <a:prstGeom prst="rect">
+            <a:avLst/>
+          </a:prstGeom>
+          <a:ln w="12700">
+            <a:miter lim="400000"/>
+          </a:ln>
+          <a:extLst>
+            <a:ext uri="{C572A759-6A51-4108-AA02-DFA0A04FC94B}">
+              <ma14:wrappingTextBoxFlag xmlns:ma14="http://schemas.microsoft.com/office/mac/drawingml/2011/main" val="1"/>
+            </a:ext>
+          </a:extLst>
+        </p:spPr>
+        <p:txBody>
+          <a:bodyPr lIns="0" tIns="0" rIns="0" bIns="0">
+            <a:spAutoFit/>
+          </a:bodyPr>
+          <a:lstStyle/>
+          <a:p>
+            <a:pPr>
+              <a:defRPr spc="0" sz="1400"/>
+            </a:pPr>
+            <a:r>
+              <a:t>An additional complex geometry enables to use any point set to describe the material volume (</a:t>
+            </a:r>
+            <a:r>
+              <a:rPr i="1"/>
+              <a:t>geomview </a:t>
+            </a:r>
+            <a:r>
+              <a:t>OFF file). </a:t>
+            </a:r>
+          </a:p>
+          <a:p>
+            <a:pPr>
+              <a:defRPr spc="0" sz="1400"/>
+            </a:pPr>
+          </a:p>
+        </p:txBody>
+      </p:sp>
       <p:pic>
         <p:nvPicPr>
-          <p:cNvPr id="343" name="Screenshot 2021-05-05 at 21.58.17.png" descr="Screenshot 2021-05-05 at 21.58.17.png"/>
+          <p:cNvPr id="356" name="image148.png" descr="image148.png"/>
+          <p:cNvPicPr>
+            <a:picLocks noChangeAspect="1"/>
+          </p:cNvPicPr>
+          <p:nvPr/>
+        </p:nvPicPr>
+        <p:blipFill>
+          <a:blip r:embed="rId2">
+            <a:extLst/>
+          </a:blip>
+          <a:stretch>
+            <a:fillRect/>
+          </a:stretch>
+        </p:blipFill>
+        <p:spPr>
+          <a:xfrm>
+            <a:off x="7846619" y="2472362"/>
+            <a:ext cx="2967333" cy="3743662"/>
+          </a:xfrm>
+          <a:prstGeom prst="rect">
+            <a:avLst/>
+          </a:prstGeom>
+          <a:ln w="12700">
+            <a:miter lim="400000"/>
+          </a:ln>
+        </p:spPr>
+      </p:pic>
+      <p:pic>
+        <p:nvPicPr>
+          <p:cNvPr id="357" name="image149.png" descr="image149.png"/>
+          <p:cNvPicPr>
+            <a:picLocks noChangeAspect="1"/>
+          </p:cNvPicPr>
+          <p:nvPr/>
+        </p:nvPicPr>
+        <p:blipFill>
+          <a:blip r:embed="rId3">
+            <a:extLst/>
+          </a:blip>
+          <a:stretch>
+            <a:fillRect/>
+          </a:stretch>
+        </p:blipFill>
+        <p:spPr>
+          <a:xfrm>
+            <a:off x="5159695" y="4211615"/>
+            <a:ext cx="2073347" cy="2323653"/>
+          </a:xfrm>
+          <a:prstGeom prst="rect">
+            <a:avLst/>
+          </a:prstGeom>
+          <a:ln w="12700">
+            <a:miter lim="400000"/>
+          </a:ln>
+        </p:spPr>
+      </p:pic>
+      <p:pic>
+        <p:nvPicPr>
+          <p:cNvPr id="358" name="image150.png" descr="image150.png"/>
+          <p:cNvPicPr>
+            <a:picLocks noChangeAspect="1"/>
+          </p:cNvPicPr>
+          <p:nvPr/>
+        </p:nvPicPr>
+        <p:blipFill>
+          <a:blip r:embed="rId4">
+            <a:extLst/>
+          </a:blip>
+          <a:stretch>
+            <a:fillRect/>
+          </a:stretch>
+        </p:blipFill>
+        <p:spPr>
+          <a:xfrm>
+            <a:off x="2171397" y="3444347"/>
+            <a:ext cx="2490100" cy="2633422"/>
+          </a:xfrm>
+          <a:prstGeom prst="rect">
+            <a:avLst/>
+          </a:prstGeom>
+          <a:ln w="12700">
+            <a:miter lim="400000"/>
+          </a:ln>
+        </p:spPr>
+      </p:pic>
+      <p:sp>
+        <p:nvSpPr>
+          <p:cNvPr id="359" name="Rectangle"/>
+          <p:cNvSpPr/>
+          <p:nvPr/>
+        </p:nvSpPr>
+        <p:spPr>
+          <a:xfrm>
+            <a:off x="2374955" y="2322035"/>
+            <a:ext cx="2145975" cy="947317"/>
+          </a:xfrm>
+          <a:prstGeom prst="rect">
+            <a:avLst/>
+          </a:prstGeom>
+          <a:solidFill>
+            <a:srgbClr val="FFFFFF"/>
+          </a:solidFill>
+          <a:ln w="25400">
+            <a:solidFill>
+              <a:schemeClr val="accent1"/>
+            </a:solidFill>
+          </a:ln>
+        </p:spPr>
+        <p:txBody>
+          <a:bodyPr lIns="46799" tIns="46799" rIns="46799" bIns="46799" anchor="ctr"/>
+          <a:lstStyle/>
+          <a:p>
+            <a:pPr/>
+          </a:p>
+        </p:txBody>
+      </p:sp>
+      <p:sp>
+        <p:nvSpPr>
+          <p:cNvPr id="360" name="Line"/>
+          <p:cNvSpPr/>
+          <p:nvPr/>
+        </p:nvSpPr>
+        <p:spPr>
+          <a:xfrm flipV="1">
+            <a:off x="2369039" y="2081788"/>
+            <a:ext cx="244825" cy="244825"/>
+          </a:xfrm>
+          <a:prstGeom prst="line">
+            <a:avLst/>
+          </a:prstGeom>
+          <a:ln w="25400">
+            <a:solidFill>
+              <a:schemeClr val="accent1"/>
+            </a:solidFill>
+          </a:ln>
+        </p:spPr>
+        <p:txBody>
+          <a:bodyPr lIns="45719" rIns="45719"/>
+          <a:lstStyle/>
+          <a:p>
+            <a:pPr/>
+          </a:p>
+        </p:txBody>
+      </p:sp>
+      <p:sp>
+        <p:nvSpPr>
+          <p:cNvPr id="361" name="Line"/>
+          <p:cNvSpPr/>
+          <p:nvPr/>
+        </p:nvSpPr>
+        <p:spPr>
+          <a:xfrm flipV="1">
+            <a:off x="4520761" y="3015312"/>
+            <a:ext cx="244825" cy="244825"/>
+          </a:xfrm>
+          <a:prstGeom prst="line">
+            <a:avLst/>
+          </a:prstGeom>
+          <a:ln w="25400">
+            <a:solidFill>
+              <a:schemeClr val="accent1"/>
+            </a:solidFill>
+          </a:ln>
+        </p:spPr>
+        <p:txBody>
+          <a:bodyPr lIns="45719" rIns="45719"/>
+          <a:lstStyle/>
+          <a:p>
+            <a:pPr/>
+          </a:p>
+        </p:txBody>
+      </p:sp>
+      <p:sp>
+        <p:nvSpPr>
+          <p:cNvPr id="362" name="Line"/>
+          <p:cNvSpPr/>
+          <p:nvPr/>
+        </p:nvSpPr>
+        <p:spPr>
+          <a:xfrm flipV="1">
+            <a:off x="4520761" y="2081788"/>
+            <a:ext cx="244825" cy="244825"/>
+          </a:xfrm>
+          <a:prstGeom prst="line">
+            <a:avLst/>
+          </a:prstGeom>
+          <a:ln w="25400">
+            <a:solidFill>
+              <a:schemeClr val="accent1"/>
+            </a:solidFill>
+          </a:ln>
+        </p:spPr>
+        <p:txBody>
+          <a:bodyPr lIns="45719" rIns="45719"/>
+          <a:lstStyle/>
+          <a:p>
+            <a:pPr/>
+          </a:p>
+        </p:txBody>
+      </p:sp>
+      <p:sp>
+        <p:nvSpPr>
+          <p:cNvPr id="363" name="Line"/>
+          <p:cNvSpPr/>
+          <p:nvPr/>
+        </p:nvSpPr>
+        <p:spPr>
+          <a:xfrm flipV="1">
+            <a:off x="4752846" y="2104455"/>
+            <a:ext cx="1" cy="916975"/>
+          </a:xfrm>
+          <a:prstGeom prst="line">
+            <a:avLst/>
+          </a:prstGeom>
+          <a:ln w="25400">
+            <a:solidFill>
+              <a:schemeClr val="accent1"/>
+            </a:solidFill>
+          </a:ln>
+        </p:spPr>
+        <p:txBody>
+          <a:bodyPr lIns="45719" rIns="45719"/>
+          <a:lstStyle/>
+          <a:p>
+            <a:pPr/>
+          </a:p>
+        </p:txBody>
+      </p:sp>
+      <p:sp>
+        <p:nvSpPr>
+          <p:cNvPr id="364" name="Line"/>
+          <p:cNvSpPr/>
+          <p:nvPr/>
+        </p:nvSpPr>
+        <p:spPr>
+          <a:xfrm flipH="1" flipV="1">
+            <a:off x="2594858" y="2086185"/>
+            <a:ext cx="2171375" cy="1"/>
+          </a:xfrm>
+          <a:prstGeom prst="line">
+            <a:avLst/>
+          </a:prstGeom>
+          <a:ln w="25400">
+            <a:solidFill>
+              <a:schemeClr val="accent1"/>
+            </a:solidFill>
+          </a:ln>
+        </p:spPr>
+        <p:txBody>
+          <a:bodyPr lIns="45719" rIns="45719"/>
+          <a:lstStyle/>
+          <a:p>
+            <a:pPr/>
+          </a:p>
+        </p:txBody>
+      </p:sp>
+      <p:sp>
+        <p:nvSpPr>
+          <p:cNvPr id="365" name="Oval"/>
+          <p:cNvSpPr/>
+          <p:nvPr/>
+        </p:nvSpPr>
+        <p:spPr>
+          <a:xfrm>
+            <a:off x="5019028" y="2089284"/>
+            <a:ext cx="987675" cy="947317"/>
+          </a:xfrm>
+          <a:prstGeom prst="ellipse">
+            <a:avLst/>
+          </a:prstGeom>
+          <a:solidFill>
+            <a:srgbClr val="FFFFFF"/>
+          </a:solidFill>
+          <a:ln w="25400">
+            <a:solidFill>
+              <a:schemeClr val="accent1"/>
+            </a:solidFill>
+          </a:ln>
+        </p:spPr>
+        <p:txBody>
+          <a:bodyPr lIns="46799" tIns="46799" rIns="46799" bIns="46799" anchor="ctr"/>
+          <a:lstStyle/>
+          <a:p>
+            <a:pPr/>
+          </a:p>
+        </p:txBody>
+      </p:sp>
+      <p:sp>
+        <p:nvSpPr>
+          <p:cNvPr id="373" name="Connection Line"/>
+          <p:cNvSpPr/>
+          <p:nvPr/>
+        </p:nvSpPr>
+        <p:spPr>
+          <a:xfrm>
+            <a:off x="5015767" y="2614440"/>
+            <a:ext cx="992567" cy="143975"/>
+          </a:xfrm>
+          <a:custGeom>
+            <a:avLst/>
+            <a:gdLst/>
+            <a:ahLst/>
+            <a:cxnLst>
+              <a:cxn ang="0">
+                <a:pos x="wd2" y="hd2"/>
+              </a:cxn>
+              <a:cxn ang="5400000">
+                <a:pos x="wd2" y="hd2"/>
+              </a:cxn>
+              <a:cxn ang="10800000">
+                <a:pos x="wd2" y="hd2"/>
+              </a:cxn>
+              <a:cxn ang="16200000">
+                <a:pos x="wd2" y="hd2"/>
+              </a:cxn>
+            </a:cxnLst>
+            <a:rect l="0" t="0" r="r" b="b"/>
+            <a:pathLst>
+              <a:path w="21600" h="16231" fill="norm" stroke="1" extrusionOk="0">
+                <a:moveTo>
+                  <a:pt x="0" y="2727"/>
+                </a:moveTo>
+                <a:cubicBezTo>
+                  <a:pt x="6228" y="21600"/>
+                  <a:pt x="13428" y="20691"/>
+                  <a:pt x="21600" y="0"/>
+                </a:cubicBezTo>
+              </a:path>
+            </a:pathLst>
+          </a:custGeom>
+          <a:ln w="25400">
+            <a:solidFill>
+              <a:schemeClr val="accent1"/>
+            </a:solidFill>
+          </a:ln>
+        </p:spPr>
+        <p:txBody>
+          <a:bodyPr/>
+          <a:lstStyle/>
+          <a:p>
+            <a:pPr/>
+          </a:p>
+        </p:txBody>
+      </p:sp>
+      <p:sp>
+        <p:nvSpPr>
+          <p:cNvPr id="367" name="Oval"/>
+          <p:cNvSpPr/>
+          <p:nvPr/>
+        </p:nvSpPr>
+        <p:spPr>
+          <a:xfrm>
+            <a:off x="6425364" y="3050807"/>
+            <a:ext cx="1004555" cy="317069"/>
+          </a:xfrm>
+          <a:prstGeom prst="ellipse">
+            <a:avLst/>
+          </a:prstGeom>
+          <a:ln w="25400">
+            <a:solidFill>
+              <a:schemeClr val="accent1">
+                <a:lumOff val="-6000"/>
+              </a:schemeClr>
+            </a:solidFill>
+          </a:ln>
+        </p:spPr>
+        <p:txBody>
+          <a:bodyPr lIns="46799" tIns="46799" rIns="46799" bIns="46799" anchor="ctr"/>
+          <a:lstStyle/>
+          <a:p>
+            <a:pPr/>
+          </a:p>
+        </p:txBody>
+      </p:sp>
+      <p:sp>
+        <p:nvSpPr>
+          <p:cNvPr id="368" name="Oval"/>
+          <p:cNvSpPr/>
+          <p:nvPr/>
+        </p:nvSpPr>
+        <p:spPr>
+          <a:xfrm>
+            <a:off x="6425364" y="1633212"/>
+            <a:ext cx="1004555" cy="317070"/>
+          </a:xfrm>
+          <a:prstGeom prst="ellipse">
+            <a:avLst/>
+          </a:prstGeom>
+          <a:ln w="25400">
+            <a:solidFill>
+              <a:schemeClr val="accent1">
+                <a:lumOff val="-6000"/>
+              </a:schemeClr>
+            </a:solidFill>
+          </a:ln>
+        </p:spPr>
+        <p:txBody>
+          <a:bodyPr lIns="46799" tIns="46799" rIns="46799" bIns="46799" anchor="ctr"/>
+          <a:lstStyle/>
+          <a:p>
+            <a:pPr/>
+          </a:p>
+        </p:txBody>
+      </p:sp>
+      <p:sp>
+        <p:nvSpPr>
+          <p:cNvPr id="369" name="Line"/>
+          <p:cNvSpPr/>
+          <p:nvPr/>
+        </p:nvSpPr>
+        <p:spPr>
+          <a:xfrm flipV="1">
+            <a:off x="6422603" y="1816971"/>
+            <a:ext cx="1" cy="1408658"/>
+          </a:xfrm>
+          <a:prstGeom prst="line">
+            <a:avLst/>
+          </a:prstGeom>
+          <a:ln w="25400">
+            <a:solidFill>
+              <a:schemeClr val="accent1">
+                <a:lumOff val="-6000"/>
+              </a:schemeClr>
+            </a:solidFill>
+          </a:ln>
+        </p:spPr>
+        <p:txBody>
+          <a:bodyPr lIns="45719" rIns="45719"/>
+          <a:lstStyle/>
+          <a:p>
+            <a:pPr/>
+          </a:p>
+        </p:txBody>
+      </p:sp>
+      <p:sp>
+        <p:nvSpPr>
+          <p:cNvPr id="370" name="Line"/>
+          <p:cNvSpPr/>
+          <p:nvPr/>
+        </p:nvSpPr>
+        <p:spPr>
+          <a:xfrm flipV="1">
+            <a:off x="7434874" y="1821773"/>
+            <a:ext cx="1" cy="1408657"/>
+          </a:xfrm>
+          <a:prstGeom prst="line">
+            <a:avLst/>
+          </a:prstGeom>
+          <a:ln w="25400">
+            <a:solidFill>
+              <a:schemeClr val="accent1">
+                <a:lumOff val="-6000"/>
+              </a:schemeClr>
+            </a:solidFill>
+          </a:ln>
+        </p:spPr>
+        <p:txBody>
+          <a:bodyPr lIns="45719" rIns="45719"/>
+          <a:lstStyle/>
+          <a:p>
+            <a:pPr/>
+          </a:p>
+        </p:txBody>
+      </p:sp>
+      <p:sp>
+        <p:nvSpPr>
+          <p:cNvPr id="371" name="Rectangle"/>
+          <p:cNvSpPr/>
+          <p:nvPr/>
+        </p:nvSpPr>
+        <p:spPr>
+          <a:xfrm>
+            <a:off x="6438665" y="2730739"/>
+            <a:ext cx="977952" cy="462005"/>
+          </a:xfrm>
+          <a:prstGeom prst="rect">
+            <a:avLst/>
+          </a:prstGeom>
+          <a:solidFill>
+            <a:srgbClr val="FFFFFF"/>
+          </a:solidFill>
+          <a:ln w="12700">
+            <a:miter lim="400000"/>
+          </a:ln>
+        </p:spPr>
+        <p:txBody>
+          <a:bodyPr lIns="46799" tIns="46799" rIns="46799" bIns="46799" anchor="ctr"/>
+          <a:lstStyle/>
+          <a:p>
+            <a:pPr/>
+          </a:p>
+        </p:txBody>
+      </p:sp>
+      <p:sp>
+        <p:nvSpPr>
+          <p:cNvPr id="372" name="CustomShape 1"/>
+          <p:cNvSpPr txBox="1"/>
+          <p:nvPr/>
+        </p:nvSpPr>
+        <p:spPr>
+          <a:xfrm>
+            <a:off x="1668980" y="3792515"/>
+            <a:ext cx="9714406" cy="1308337"/>
+          </a:xfrm>
+          <a:prstGeom prst="rect">
+            <a:avLst/>
+          </a:prstGeom>
+          <a:solidFill>
+            <a:srgbClr val="FFFFFF"/>
+          </a:solidFill>
+          <a:ln w="25400">
+            <a:solidFill>
+              <a:schemeClr val="accent1">
+                <a:lumOff val="-6000"/>
+              </a:schemeClr>
+            </a:solidFill>
+            <a:miter lim="400000"/>
+          </a:ln>
+          <a:extLst>
+            <a:ext uri="{C572A759-6A51-4108-AA02-DFA0A04FC94B}">
+              <ma14:wrappingTextBoxFlag xmlns:ma14="http://schemas.microsoft.com/office/mac/drawingml/2011/main" val="1"/>
+            </a:ext>
+          </a:extLst>
+        </p:spPr>
+        <p:txBody>
+          <a:bodyPr lIns="0" tIns="0" rIns="0" bIns="0">
+            <a:spAutoFit/>
+          </a:bodyPr>
+          <a:lstStyle>
+            <a:lvl1pPr>
+              <a:defRPr spc="0" sz="3000"/>
+            </a:lvl1pPr>
+          </a:lstStyle>
+          <a:p>
+            <a:pPr/>
+            <a:r>
+              <a:t>New developments are in the pipe e.g. for multi-phase materials, refractive effects, phase-contrast imaging techniques, these are not ready yet.</a:t>
+            </a:r>
+          </a:p>
+        </p:txBody>
+      </p:sp>
+    </p:spTree>
+  </p:cSld>
+  <p:clrMapOvr>
+    <a:masterClrMapping/>
+  </p:clrMapOvr>
+  <p:transition xmlns:p14="http://schemas.microsoft.com/office/powerpoint/2010/main" spd="med" advClick="1"/>
+</p:sld>
+</file>
+
+<file path=ppt/slides/slide11.xml><?xml version="1.0" encoding="utf-8"?>
+<p:sld xmlns:a="http://schemas.openxmlformats.org/drawingml/2006/main" xmlns:r="http://schemas.openxmlformats.org/officeDocument/2006/relationships" xmlns:p="http://schemas.openxmlformats.org/presentationml/2006/main" xmlns:m="http://schemas.openxmlformats.org/officeDocument/2006/math" xmlns:a14="http://schemas.microsoft.com/office/drawing/2010/main" showMasterSp="1" showMasterPhAnim="1">
+  <p:cSld>
+    <p:spTree>
+      <p:nvGrpSpPr>
+        <p:cNvPr id="1" name=""/>
+        <p:cNvGrpSpPr/>
+        <p:nvPr/>
+      </p:nvGrpSpPr>
+      <p:grpSpPr>
+        <a:xfrm>
+          <a:off x="0" y="0"/>
+          <a:ext cx="0" cy="0"/>
+          <a:chOff x="0" y="0"/>
+          <a:chExt cx="0" cy="0"/>
+        </a:xfrm>
+      </p:grpSpPr>
+      <p:pic>
+        <p:nvPicPr>
+          <p:cNvPr id="375" name="Screenshot 2021-05-05 at 22.08.43.png" descr="Screenshot 2021-05-05 at 22.08.43.png"/>
+          <p:cNvPicPr>
+            <a:picLocks noChangeAspect="1"/>
+          </p:cNvPicPr>
+          <p:nvPr/>
+        </p:nvPicPr>
+        <p:blipFill>
+          <a:blip r:embed="rId2">
+            <a:extLst/>
+          </a:blip>
+          <a:stretch>
+            <a:fillRect/>
+          </a:stretch>
+        </p:blipFill>
+        <p:spPr>
+          <a:xfrm>
+            <a:off x="5348679" y="893846"/>
+            <a:ext cx="6750113" cy="2778736"/>
+          </a:xfrm>
+          <a:prstGeom prst="rect">
+            <a:avLst/>
+          </a:prstGeom>
+          <a:ln w="12700">
+            <a:miter lim="400000"/>
+          </a:ln>
+        </p:spPr>
+      </p:pic>
+      <p:sp>
+        <p:nvSpPr>
+          <p:cNvPr id="376" name="Title 4"/>
+          <p:cNvSpPr txBox="1"/>
+          <p:nvPr>
+            <p:ph type="title"/>
+          </p:nvPr>
+        </p:nvSpPr>
+        <p:spPr>
+          <a:xfrm>
+            <a:off x="1774725" y="426125"/>
+            <a:ext cx="9312376" cy="972718"/>
+          </a:xfrm>
+          <a:prstGeom prst="rect">
+            <a:avLst/>
+          </a:prstGeom>
+        </p:spPr>
+        <p:txBody>
+          <a:bodyPr/>
+          <a:lstStyle/>
+          <a:p>
+            <a:pPr/>
+            <a:r>
+              <a:t>Inelastic scattering S(q,w)</a:t>
+            </a:r>
+          </a:p>
+        </p:txBody>
+      </p:sp>
+      <p:sp>
+        <p:nvSpPr>
+          <p:cNvPr id="377" name="Content Placeholder 5"/>
+          <p:cNvSpPr txBox="1"/>
+          <p:nvPr>
+            <p:ph type="body" idx="1"/>
+          </p:nvPr>
+        </p:nvSpPr>
+        <p:spPr>
+          <a:xfrm>
+            <a:off x="1774799" y="1706398"/>
+            <a:ext cx="9312376" cy="4545581"/>
+          </a:xfrm>
+          <a:prstGeom prst="rect">
+            <a:avLst/>
+          </a:prstGeom>
+        </p:spPr>
+        <p:txBody>
+          <a:bodyPr/>
+          <a:lstStyle/>
+          <a:p>
+            <a:pPr/>
+            <a:r>
+              <a:t>Partial differential cross section</a:t>
+            </a:r>
+          </a:p>
+          <a:p>
+            <a:pPr/>
+            <a:r>
+              <a:t>Scattering function</a:t>
+            </a:r>
+          </a:p>
+          <a:p>
+            <a:pPr/>
+          </a:p>
+          <a:p>
+            <a:pPr/>
+            <a:r>
+              <a:t>Phonons, Spin waves, … </a:t>
+            </a:r>
+          </a:p>
+        </p:txBody>
+      </p:sp>
+      <p:sp>
+        <p:nvSpPr>
+          <p:cNvPr id="378" name="Slide Number Placeholder 3"/>
+          <p:cNvSpPr txBox="1"/>
+          <p:nvPr>
+            <p:ph type="sldNum" sz="quarter" idx="2"/>
+          </p:nvPr>
+        </p:nvSpPr>
+        <p:spPr>
+          <a:prstGeom prst="rect">
+            <a:avLst/>
+          </a:prstGeom>
+          <a:extLst>
+            <a:ext uri="{C572A759-6A51-4108-AA02-DFA0A04FC94B}">
+              <ma14:wrappingTextBoxFlag xmlns:ma14="http://schemas.microsoft.com/office/mac/drawingml/2011/main" val="1"/>
+            </a:ext>
+          </a:extLst>
+        </p:spPr>
+        <p:txBody>
+          <a:bodyPr/>
+          <a:lstStyle/>
+          <a:p>
+            <a:pPr/>
+            <a:fld id="{86CB4B4D-7CA3-9044-876B-883B54F8677D}" type="slidenum"/>
+          </a:p>
+        </p:txBody>
+      </p:sp>
+      <p:pic>
+        <p:nvPicPr>
+          <p:cNvPr id="379" name="Picture 2" descr="Picture 2"/>
+          <p:cNvPicPr>
+            <a:picLocks noChangeAspect="1"/>
+          </p:cNvPicPr>
+          <p:nvPr/>
+        </p:nvPicPr>
+        <p:blipFill>
+          <a:blip r:embed="rId3">
+            <a:extLst/>
+          </a:blip>
+          <a:stretch>
+            <a:fillRect/>
+          </a:stretch>
+        </p:blipFill>
+        <p:spPr>
+          <a:xfrm>
+            <a:off x="3115753" y="3726038"/>
+            <a:ext cx="3745649" cy="876387"/>
+          </a:xfrm>
+          <a:prstGeom prst="rect">
+            <a:avLst/>
+          </a:prstGeom>
+          <a:ln w="12700">
+            <a:miter lim="400000"/>
+          </a:ln>
+        </p:spPr>
+      </p:pic>
+      <p:pic>
+        <p:nvPicPr>
+          <p:cNvPr id="380" name="Picture 4" descr="Picture 4"/>
+          <p:cNvPicPr>
+            <a:picLocks noChangeAspect="1"/>
+          </p:cNvPicPr>
+          <p:nvPr/>
+        </p:nvPicPr>
+        <p:blipFill>
+          <a:blip r:embed="rId4">
+            <a:extLst/>
+          </a:blip>
+          <a:stretch>
+            <a:fillRect/>
+          </a:stretch>
+        </p:blipFill>
+        <p:spPr>
+          <a:xfrm>
+            <a:off x="3537272" y="4602424"/>
+            <a:ext cx="6359081" cy="776108"/>
+          </a:xfrm>
+          <a:prstGeom prst="rect">
+            <a:avLst/>
+          </a:prstGeom>
+          <a:ln w="12700">
+            <a:miter lim="400000"/>
+          </a:ln>
+        </p:spPr>
+      </p:pic>
+    </p:spTree>
+  </p:cSld>
+  <p:clrMapOvr>
+    <a:masterClrMapping/>
+  </p:clrMapOvr>
+  <p:transition xmlns:p14="http://schemas.microsoft.com/office/powerpoint/2010/main" spd="med" advClick="1"/>
+</p:sld>
+</file>
+
+<file path=ppt/slides/slide12.xml><?xml version="1.0" encoding="utf-8"?>
+<p:sld xmlns:a="http://schemas.openxmlformats.org/drawingml/2006/main" xmlns:r="http://schemas.openxmlformats.org/officeDocument/2006/relationships" xmlns:p="http://schemas.openxmlformats.org/presentationml/2006/main" xmlns:m="http://schemas.openxmlformats.org/officeDocument/2006/math" xmlns:a14="http://schemas.microsoft.com/office/drawing/2010/main" showMasterSp="1" showMasterPhAnim="1">
+  <p:cSld>
+    <p:spTree>
+      <p:nvGrpSpPr>
+        <p:cNvPr id="1" name=""/>
+        <p:cNvGrpSpPr/>
+        <p:nvPr/>
+      </p:nvGrpSpPr>
+      <p:grpSpPr>
+        <a:xfrm>
+          <a:off x="0" y="0"/>
+          <a:ext cx="0" cy="0"/>
+          <a:chOff x="0" y="0"/>
+          <a:chExt cx="0" cy="0"/>
+        </a:xfrm>
+      </p:grpSpPr>
+      <p:sp>
+        <p:nvSpPr>
+          <p:cNvPr id="382" name="McStas samples with inelastic options"/>
+          <p:cNvSpPr txBox="1"/>
+          <p:nvPr>
+            <p:ph type="title"/>
+          </p:nvPr>
+        </p:nvSpPr>
+        <p:spPr>
+          <a:xfrm>
+            <a:off x="2337250" y="-243692"/>
+            <a:ext cx="9312375" cy="795814"/>
+          </a:xfrm>
+          <a:prstGeom prst="rect">
+            <a:avLst/>
+          </a:prstGeom>
+        </p:spPr>
+        <p:txBody>
+          <a:bodyPr/>
+          <a:lstStyle/>
+          <a:p>
+            <a:pPr/>
+            <a:r>
+              <a:t>McStas samples with inelastic options</a:t>
+            </a:r>
+          </a:p>
+        </p:txBody>
+      </p:sp>
+      <p:sp>
+        <p:nvSpPr>
+          <p:cNvPr id="383" name="Double-click to edit"/>
+          <p:cNvSpPr txBox="1"/>
+          <p:nvPr>
+            <p:ph type="body" idx="1"/>
+          </p:nvPr>
+        </p:nvSpPr>
+        <p:spPr>
+          <a:prstGeom prst="rect">
+            <a:avLst/>
+          </a:prstGeom>
+        </p:spPr>
+        <p:txBody>
+          <a:bodyPr/>
+          <a:lstStyle/>
+          <a:p>
+            <a:pPr/>
+          </a:p>
+        </p:txBody>
+      </p:sp>
+      <p:sp>
+        <p:nvSpPr>
+          <p:cNvPr id="384" name="Slide Number"/>
+          <p:cNvSpPr txBox="1"/>
+          <p:nvPr>
+            <p:ph type="sldNum" sz="quarter" idx="2"/>
+          </p:nvPr>
+        </p:nvSpPr>
+        <p:spPr>
+          <a:prstGeom prst="rect">
+            <a:avLst/>
+          </a:prstGeom>
+          <a:extLst>
+            <a:ext uri="{C572A759-6A51-4108-AA02-DFA0A04FC94B}">
+              <ma14:wrappingTextBoxFlag xmlns:ma14="http://schemas.microsoft.com/office/mac/drawingml/2011/main" val="1"/>
+            </a:ext>
+          </a:extLst>
+        </p:spPr>
+        <p:txBody>
+          <a:bodyPr/>
+          <a:lstStyle/>
+          <a:p>
+            <a:pPr/>
+            <a:fld id="{86CB4B4D-7CA3-9044-876B-883B54F8677D}" type="slidenum"/>
+          </a:p>
+        </p:txBody>
+      </p:sp>
+      <p:pic>
+        <p:nvPicPr>
+          <p:cNvPr id="385" name="Screenshot 2021-05-05 at 21.58.17.png" descr="Screenshot 2021-05-05 at 21.58.17.png"/>
           <p:cNvPicPr>
             <a:picLocks noChangeAspect="1"/>
           </p:cNvPicPr>
@@ -17621,7 +18472,7 @@
       </p:pic>
       <p:pic>
         <p:nvPicPr>
-          <p:cNvPr id="344" name="Screenshot 2021-05-05 at 21.54.43.png" descr="Screenshot 2021-05-05 at 21.54.43.png"/>
+          <p:cNvPr id="386" name="Screenshot 2021-05-05 at 21.54.43.png" descr="Screenshot 2021-05-05 at 21.54.43.png"/>
           <p:cNvPicPr>
             <a:picLocks noChangeAspect="1"/>
           </p:cNvPicPr>
@@ -17657,7 +18508,7 @@
 </p:sld>
 </file>
 
-<file path=ppt/slides/slide11.xml><?xml version="1.0" encoding="utf-8"?>
+<file path=ppt/slides/slide13.xml><?xml version="1.0" encoding="utf-8"?>
 <p:sld xmlns:a="http://schemas.openxmlformats.org/drawingml/2006/main" xmlns:r="http://schemas.openxmlformats.org/officeDocument/2006/relationships" xmlns:p="http://schemas.openxmlformats.org/presentationml/2006/main" xmlns:m="http://schemas.openxmlformats.org/officeDocument/2006/math" xmlns:a14="http://schemas.microsoft.com/office/drawing/2010/main" showMasterSp="1" showMasterPhAnim="1">
   <p:cSld>
     <p:spTree>
@@ -17676,7 +18527,7 @@
       </p:grpSpPr>
       <p:grpSp>
         <p:nvGrpSpPr>
-          <p:cNvPr id="355" name="Group"/>
+          <p:cNvPr id="397" name="Group"/>
           <p:cNvGrpSpPr/>
           <p:nvPr/>
         </p:nvGrpSpPr>
@@ -17690,7 +18541,7 @@
         </p:grpSpPr>
         <p:pic>
           <p:nvPicPr>
-            <p:cNvPr id="346" name="Picture 15" descr="Picture 15"/>
+            <p:cNvPr id="388" name="Picture 15" descr="Picture 15"/>
             <p:cNvPicPr>
               <a:picLocks noChangeAspect="1"/>
             </p:cNvPicPr>
@@ -17721,7 +18572,7 @@
         </p:pic>
         <p:sp>
           <p:nvSpPr>
-            <p:cNvPr id="347" name="Straight Arrow Connector 2"/>
+            <p:cNvPr id="389" name="Straight Arrow Connector 2"/>
             <p:cNvSpPr/>
             <p:nvPr/>
           </p:nvSpPr>
@@ -17762,7 +18613,7 @@
         </p:sp>
         <p:sp>
           <p:nvSpPr>
-            <p:cNvPr id="348" name="Straight Arrow Connector 7"/>
+            <p:cNvPr id="390" name="Straight Arrow Connector 7"/>
             <p:cNvSpPr/>
             <p:nvPr/>
           </p:nvSpPr>
@@ -17803,7 +18654,7 @@
         </p:sp>
         <p:sp>
           <p:nvSpPr>
-            <p:cNvPr id="349" name="TextBox 5"/>
+            <p:cNvPr id="391" name="TextBox 5"/>
             <p:cNvSpPr txBox="1"/>
             <p:nvPr/>
           </p:nvSpPr>
@@ -17846,7 +18697,7 @@
         </p:sp>
         <p:sp>
           <p:nvSpPr>
-            <p:cNvPr id="350" name="TextBox 6"/>
+            <p:cNvPr id="392" name="TextBox 6"/>
             <p:cNvSpPr txBox="1"/>
             <p:nvPr/>
           </p:nvSpPr>
@@ -17889,7 +18740,7 @@
         </p:sp>
         <p:sp>
           <p:nvSpPr>
-            <p:cNvPr id="351" name="TextBox 11"/>
+            <p:cNvPr id="393" name="TextBox 11"/>
             <p:cNvSpPr txBox="1"/>
             <p:nvPr/>
           </p:nvSpPr>
@@ -17934,7 +18785,7 @@
         </p:sp>
         <p:sp>
           <p:nvSpPr>
-            <p:cNvPr id="352" name="Oval 8"/>
+            <p:cNvPr id="394" name="Oval 8"/>
             <p:cNvSpPr/>
             <p:nvPr/>
           </p:nvSpPr>
@@ -17970,7 +18821,7 @@
         </p:sp>
         <p:sp>
           <p:nvSpPr>
-            <p:cNvPr id="353" name="Rectangle 9"/>
+            <p:cNvPr id="395" name="Rectangle 9"/>
             <p:cNvSpPr/>
             <p:nvPr/>
           </p:nvSpPr>
@@ -18006,7 +18857,7 @@
         </p:sp>
         <p:sp>
           <p:nvSpPr>
-            <p:cNvPr id="354" name="Content Placeholder 5"/>
+            <p:cNvPr id="396" name="Content Placeholder 5"/>
             <p:cNvSpPr txBox="1"/>
             <p:nvPr/>
           </p:nvSpPr>
@@ -18055,7 +18906,7 @@
       </p:grpSp>
       <p:sp>
         <p:nvSpPr>
-          <p:cNvPr id="356" name="Title 4"/>
+          <p:cNvPr id="398" name="Title 4"/>
           <p:cNvSpPr txBox="1"/>
           <p:nvPr>
             <p:ph type="title"/>
@@ -18083,7 +18934,7 @@
       </p:sp>
       <p:sp>
         <p:nvSpPr>
-          <p:cNvPr id="357" name="Content Placeholder 5"/>
+          <p:cNvPr id="399" name="Content Placeholder 5"/>
           <p:cNvSpPr txBox="1"/>
           <p:nvPr>
             <p:ph type="body" idx="1"/>
@@ -18111,7 +18962,7 @@
       </p:sp>
       <p:sp>
         <p:nvSpPr>
-          <p:cNvPr id="358" name="Slide Number Placeholder 3"/>
+          <p:cNvPr id="400" name="Slide Number Placeholder 3"/>
           <p:cNvSpPr txBox="1"/>
           <p:nvPr>
             <p:ph type="sldNum" sz="quarter" idx="2"/>
@@ -18138,7 +18989,7 @@
       </p:sp>
       <p:pic>
         <p:nvPicPr>
-          <p:cNvPr id="359" name="Picture 5" descr="Picture 5"/>
+          <p:cNvPr id="401" name="Picture 5" descr="Picture 5"/>
           <p:cNvPicPr>
             <a:picLocks noChangeAspect="1"/>
           </p:cNvPicPr>
@@ -18167,7 +19018,7 @@
       </p:pic>
       <p:sp>
         <p:nvSpPr>
-          <p:cNvPr id="360" name="TextBox 15"/>
+          <p:cNvPr id="402" name="TextBox 15"/>
           <p:cNvSpPr txBox="1"/>
           <p:nvPr/>
         </p:nvSpPr>
@@ -18210,7 +19061,7 @@
 </p:sld>
 </file>
 
-<file path=ppt/slides/slide12.xml><?xml version="1.0" encoding="utf-8"?>
+<file path=ppt/slides/slide14.xml><?xml version="1.0" encoding="utf-8"?>
 <p:sld xmlns:a="http://schemas.openxmlformats.org/drawingml/2006/main" xmlns:r="http://schemas.openxmlformats.org/officeDocument/2006/relationships" xmlns:p="http://schemas.openxmlformats.org/presentationml/2006/main" xmlns:m="http://schemas.openxmlformats.org/officeDocument/2006/math" xmlns:a14="http://schemas.microsoft.com/office/drawing/2010/main" showMasterSp="1" showMasterPhAnim="1">
   <p:cSld>
     <p:spTree>
@@ -18229,7 +19080,7 @@
       </p:grpSpPr>
       <p:sp>
         <p:nvSpPr>
-          <p:cNvPr id="362" name="Title 4"/>
+          <p:cNvPr id="404" name="Title 4"/>
           <p:cNvSpPr txBox="1"/>
           <p:nvPr>
             <p:ph type="title"/>
@@ -18257,7 +19108,7 @@
       </p:sp>
       <p:sp>
         <p:nvSpPr>
-          <p:cNvPr id="363" name="Content Placeholder 5"/>
+          <p:cNvPr id="405" name="Content Placeholder 5"/>
           <p:cNvSpPr txBox="1"/>
           <p:nvPr>
             <p:ph type="body" idx="1"/>
@@ -18265,7 +19116,7 @@
         </p:nvSpPr>
         <p:spPr>
           <a:xfrm>
-            <a:off x="1774799" y="1706398"/>
+            <a:off x="1609699" y="1706398"/>
             <a:ext cx="9312376" cy="4545581"/>
           </a:xfrm>
           <a:prstGeom prst="rect">
@@ -18309,12 +19160,32 @@
             <a:r>
               <a:t>very similar</a:t>
             </a:r>
+            <a:br/>
+            <a:br/>
+          </a:p>
+          <a:p>
+            <a:pPr/>
+            <a:r>
+              <a:t>Describes coherent “closed-form”</a:t>
+            </a:r>
+            <a:br/>
+            <a:r>
+              <a:t>inelastic scattering, generalisations</a:t>
+            </a:r>
+            <a:br/>
+            <a:r>
+              <a:t>foreseen, different lattice-dep. </a:t>
+            </a:r>
+            <a:br/>
+            <a:r>
+              <a:t>Other dispersion shapes?</a:t>
+            </a:r>
           </a:p>
         </p:txBody>
       </p:sp>
       <p:sp>
         <p:nvSpPr>
-          <p:cNvPr id="364" name="Slide Number Placeholder 3"/>
+          <p:cNvPr id="406" name="Slide Number Placeholder 3"/>
           <p:cNvSpPr txBox="1"/>
           <p:nvPr>
             <p:ph type="sldNum" sz="quarter" idx="2"/>
@@ -18341,7 +19212,7 @@
       </p:sp>
       <p:pic>
         <p:nvPicPr>
-          <p:cNvPr id="365" name="Picture 2" descr="Picture 2"/>
+          <p:cNvPr id="407" name="Picture 2" descr="Picture 2"/>
           <p:cNvPicPr>
             <a:picLocks noChangeAspect="1"/>
           </p:cNvPicPr>
@@ -18358,8 +19229,8 @@
         </p:blipFill>
         <p:spPr>
           <a:xfrm>
-            <a:off x="5326379" y="1543862"/>
-            <a:ext cx="6679835" cy="4879799"/>
+            <a:off x="5431035" y="1539201"/>
+            <a:ext cx="6679834" cy="4879798"/>
           </a:xfrm>
           <a:prstGeom prst="rect">
             <a:avLst/>
@@ -18371,7 +19242,7 @@
       </p:pic>
       <p:sp>
         <p:nvSpPr>
-          <p:cNvPr id="366" name="TextBox 3"/>
+          <p:cNvPr id="408" name="TextBox 3"/>
           <p:cNvSpPr txBox="1"/>
           <p:nvPr/>
         </p:nvSpPr>
@@ -18422,7 +19293,7 @@
 </p:sld>
 </file>
 
-<file path=ppt/slides/slide13.xml><?xml version="1.0" encoding="utf-8"?>
+<file path=ppt/slides/slide15.xml><?xml version="1.0" encoding="utf-8"?>
 <p:sld xmlns:a="http://schemas.openxmlformats.org/drawingml/2006/main" xmlns:r="http://schemas.openxmlformats.org/officeDocument/2006/relationships" xmlns:p="http://schemas.openxmlformats.org/presentationml/2006/main" xmlns:m="http://schemas.openxmlformats.org/officeDocument/2006/math" xmlns:a14="http://schemas.microsoft.com/office/drawing/2010/main" showMasterSp="1" showMasterPhAnim="1">
   <p:cSld>
     <p:spTree>
@@ -18441,7 +19312,7 @@
       </p:grpSpPr>
       <p:sp>
         <p:nvSpPr>
-          <p:cNvPr id="368" name="Title 4"/>
+          <p:cNvPr id="410" name="Title 4"/>
           <p:cNvSpPr txBox="1"/>
           <p:nvPr>
             <p:ph type="title"/>
@@ -18469,7 +19340,7 @@
       </p:sp>
       <p:sp>
         <p:nvSpPr>
-          <p:cNvPr id="369" name="Content Placeholder 5"/>
+          <p:cNvPr id="411" name="Content Placeholder 5"/>
           <p:cNvSpPr txBox="1"/>
           <p:nvPr>
             <p:ph type="body" idx="1"/>
@@ -18509,7 +19380,7 @@
       </p:sp>
       <p:sp>
         <p:nvSpPr>
-          <p:cNvPr id="370" name="Slide Number Placeholder 3"/>
+          <p:cNvPr id="412" name="Slide Number Placeholder 3"/>
           <p:cNvSpPr txBox="1"/>
           <p:nvPr>
             <p:ph type="sldNum" sz="quarter" idx="2"/>
@@ -18536,7 +19407,7 @@
       </p:sp>
       <p:pic>
         <p:nvPicPr>
-          <p:cNvPr id="371" name="Picture 2" descr="Picture 2"/>
+          <p:cNvPr id="413" name="Picture 2" descr="Picture 2"/>
           <p:cNvPicPr>
             <a:picLocks noChangeAspect="1"/>
           </p:cNvPicPr>
@@ -18565,7 +19436,7 @@
       </p:pic>
       <p:pic>
         <p:nvPicPr>
-          <p:cNvPr id="372" name="Picture 2" descr="Picture 2"/>
+          <p:cNvPr id="414" name="Picture 2" descr="Picture 2"/>
           <p:cNvPicPr>
             <a:picLocks noChangeAspect="1"/>
           </p:cNvPicPr>
@@ -18601,7 +19472,7 @@
 </p:sld>
 </file>
 
-<file path=ppt/slides/slide14.xml><?xml version="1.0" encoding="utf-8"?>
+<file path=ppt/slides/slide16.xml><?xml version="1.0" encoding="utf-8"?>
 <p:sld xmlns:a="http://schemas.openxmlformats.org/drawingml/2006/main" xmlns:r="http://schemas.openxmlformats.org/officeDocument/2006/relationships" xmlns:p="http://schemas.openxmlformats.org/presentationml/2006/main" xmlns:m="http://schemas.openxmlformats.org/officeDocument/2006/math" xmlns:a14="http://schemas.microsoft.com/office/drawing/2010/main" showMasterSp="1" showMasterPhAnim="1">
   <p:cSld>
     <p:spTree>
@@ -18620,7 +19491,7 @@
       </p:grpSpPr>
       <p:sp>
         <p:nvSpPr>
-          <p:cNvPr id="374" name="Example component"/>
+          <p:cNvPr id="416" name="Example component"/>
           <p:cNvSpPr txBox="1"/>
           <p:nvPr>
             <p:ph type="title"/>
@@ -18644,7 +19515,7 @@
       </p:sp>
       <p:sp>
         <p:nvSpPr>
-          <p:cNvPr id="375" name="Single_crystal_inelastic…"/>
+          <p:cNvPr id="417" name="Single_crystal_inelastic…"/>
           <p:cNvSpPr txBox="1"/>
           <p:nvPr>
             <p:ph type="body" idx="1"/>
@@ -18684,12 +19555,19 @@
             <a:r>
               <a:t>BIG tables, lots of memory, close to impossible to use for anything but “locally” in reciprocal space, i.e. in TAS settings</a:t>
             </a:r>
+            <a:br/>
+          </a:p>
+          <a:p>
+            <a:pPr/>
+            <a:r>
+              <a:t>We are looking for good alternatives</a:t>
+            </a:r>
           </a:p>
         </p:txBody>
       </p:sp>
       <p:sp>
         <p:nvSpPr>
-          <p:cNvPr id="376" name="Slide Number"/>
+          <p:cNvPr id="418" name="Slide Number"/>
           <p:cNvSpPr txBox="1"/>
           <p:nvPr>
             <p:ph type="sldNum" sz="quarter" idx="2"/>
@@ -18723,7 +19601,7 @@
 </p:sld>
 </file>
 
-<file path=ppt/slides/slide15.xml><?xml version="1.0" encoding="utf-8"?>
+<file path=ppt/slides/slide17.xml><?xml version="1.0" encoding="utf-8"?>
 <p:sld xmlns:a="http://schemas.openxmlformats.org/drawingml/2006/main" xmlns:r="http://schemas.openxmlformats.org/officeDocument/2006/relationships" xmlns:p="http://schemas.openxmlformats.org/presentationml/2006/main" xmlns:m="http://schemas.openxmlformats.org/officeDocument/2006/math" xmlns:a14="http://schemas.microsoft.com/office/drawing/2010/main" showMasterSp="1" showMasterPhAnim="1">
   <p:cSld>
     <p:spTree>
@@ -18742,7 +19620,7 @@
       </p:grpSpPr>
       <p:sp>
         <p:nvSpPr>
-          <p:cNvPr id="378" name="Title 4"/>
+          <p:cNvPr id="420" name="Title 4"/>
           <p:cNvSpPr txBox="1"/>
           <p:nvPr>
             <p:ph type="title"/>
@@ -18770,7 +19648,7 @@
       </p:sp>
       <p:sp>
         <p:nvSpPr>
-          <p:cNvPr id="379" name="Content Placeholder 5"/>
+          <p:cNvPr id="421" name="Content Placeholder 5"/>
           <p:cNvSpPr txBox="1"/>
           <p:nvPr>
             <p:ph type="body" idx="1"/>
@@ -18810,7 +19688,7 @@
       </p:sp>
       <p:sp>
         <p:nvSpPr>
-          <p:cNvPr id="380" name="Slide Number Placeholder 3"/>
+          <p:cNvPr id="422" name="Slide Number Placeholder 3"/>
           <p:cNvSpPr txBox="1"/>
           <p:nvPr>
             <p:ph type="sldNum" sz="quarter" idx="2"/>
@@ -18837,7 +19715,7 @@
       </p:sp>
       <p:sp>
         <p:nvSpPr>
-          <p:cNvPr id="381" name="Straight Arrow Connector 2"/>
+          <p:cNvPr id="423" name="Straight Arrow Connector 2"/>
           <p:cNvSpPr/>
           <p:nvPr/>
         </p:nvSpPr>
@@ -18873,7 +19751,7 @@
       </p:sp>
       <p:sp>
         <p:nvSpPr>
-          <p:cNvPr id="382" name="Straight Arrow Connector 7"/>
+          <p:cNvPr id="424" name="Straight Arrow Connector 7"/>
           <p:cNvSpPr/>
           <p:nvPr/>
         </p:nvSpPr>
@@ -18909,7 +19787,7 @@
       </p:sp>
       <p:sp>
         <p:nvSpPr>
-          <p:cNvPr id="383" name="Straight Arrow Connector 9"/>
+          <p:cNvPr id="425" name="Straight Arrow Connector 9"/>
           <p:cNvSpPr/>
           <p:nvPr/>
         </p:nvSpPr>
@@ -18945,7 +19823,7 @@
       </p:sp>
       <p:sp>
         <p:nvSpPr>
-          <p:cNvPr id="384" name="Straight Connector 15"/>
+          <p:cNvPr id="426" name="Straight Connector 15"/>
           <p:cNvSpPr/>
           <p:nvPr/>
         </p:nvSpPr>
@@ -18980,7 +19858,7 @@
       </p:sp>
       <p:sp>
         <p:nvSpPr>
-          <p:cNvPr id="385" name="Straight Connector 20"/>
+          <p:cNvPr id="427" name="Straight Connector 20"/>
           <p:cNvSpPr/>
           <p:nvPr/>
         </p:nvSpPr>
@@ -19015,7 +19893,7 @@
       </p:sp>
       <p:sp>
         <p:nvSpPr>
-          <p:cNvPr id="386" name="Straight Connector 22"/>
+          <p:cNvPr id="428" name="Straight Connector 22"/>
           <p:cNvSpPr/>
           <p:nvPr/>
         </p:nvSpPr>
@@ -19050,7 +19928,7 @@
       </p:sp>
       <p:sp>
         <p:nvSpPr>
-          <p:cNvPr id="387" name="Straight Connector 23"/>
+          <p:cNvPr id="429" name="Straight Connector 23"/>
           <p:cNvSpPr/>
           <p:nvPr/>
         </p:nvSpPr>
@@ -19085,7 +19963,7 @@
       </p:sp>
       <p:sp>
         <p:nvSpPr>
-          <p:cNvPr id="388" name="Straight Connector 24"/>
+          <p:cNvPr id="430" name="Straight Connector 24"/>
           <p:cNvSpPr/>
           <p:nvPr/>
         </p:nvSpPr>
@@ -19120,7 +19998,7 @@
       </p:sp>
       <p:sp>
         <p:nvSpPr>
-          <p:cNvPr id="389" name="Straight Connector 25"/>
+          <p:cNvPr id="431" name="Straight Connector 25"/>
           <p:cNvSpPr/>
           <p:nvPr/>
         </p:nvSpPr>
@@ -19155,7 +20033,7 @@
       </p:sp>
       <p:sp>
         <p:nvSpPr>
-          <p:cNvPr id="390" name="Straight Connector 26"/>
+          <p:cNvPr id="432" name="Straight Connector 26"/>
           <p:cNvSpPr/>
           <p:nvPr/>
         </p:nvSpPr>
@@ -19190,7 +20068,7 @@
       </p:sp>
       <p:sp>
         <p:nvSpPr>
-          <p:cNvPr id="391" name="Straight Connector 27"/>
+          <p:cNvPr id="433" name="Straight Connector 27"/>
           <p:cNvSpPr/>
           <p:nvPr/>
         </p:nvSpPr>
@@ -19225,7 +20103,7 @@
       </p:sp>
       <p:sp>
         <p:nvSpPr>
-          <p:cNvPr id="392" name="Straight Connector 30"/>
+          <p:cNvPr id="434" name="Straight Connector 30"/>
           <p:cNvSpPr/>
           <p:nvPr/>
         </p:nvSpPr>
@@ -19260,7 +20138,7 @@
       </p:sp>
       <p:sp>
         <p:nvSpPr>
-          <p:cNvPr id="393" name="Straight Connector 34"/>
+          <p:cNvPr id="435" name="Straight Connector 34"/>
           <p:cNvSpPr/>
           <p:nvPr/>
         </p:nvSpPr>
@@ -19295,7 +20173,7 @@
       </p:sp>
       <p:sp>
         <p:nvSpPr>
-          <p:cNvPr id="394" name="Straight Connector 35"/>
+          <p:cNvPr id="436" name="Straight Connector 35"/>
           <p:cNvSpPr/>
           <p:nvPr/>
         </p:nvSpPr>
@@ -19330,7 +20208,7 @@
       </p:sp>
       <p:sp>
         <p:nvSpPr>
-          <p:cNvPr id="395" name="Straight Connector 36"/>
+          <p:cNvPr id="437" name="Straight Connector 36"/>
           <p:cNvSpPr/>
           <p:nvPr/>
         </p:nvSpPr>
@@ -19365,7 +20243,7 @@
       </p:sp>
       <p:sp>
         <p:nvSpPr>
-          <p:cNvPr id="396" name="TextBox 37"/>
+          <p:cNvPr id="438" name="TextBox 37"/>
           <p:cNvSpPr txBox="1"/>
           <p:nvPr/>
         </p:nvSpPr>
@@ -19407,7 +20285,7 @@
       </p:sp>
       <p:sp>
         <p:nvSpPr>
-          <p:cNvPr id="397" name="TextBox 38"/>
+          <p:cNvPr id="439" name="TextBox 38"/>
           <p:cNvSpPr txBox="1"/>
           <p:nvPr/>
         </p:nvSpPr>
@@ -19449,7 +20327,7 @@
       </p:sp>
       <p:sp>
         <p:nvSpPr>
-          <p:cNvPr id="398" name="TextBox 39"/>
+          <p:cNvPr id="440" name="TextBox 39"/>
           <p:cNvSpPr txBox="1"/>
           <p:nvPr/>
         </p:nvSpPr>
@@ -19491,7 +20369,7 @@
       </p:sp>
       <p:sp>
         <p:nvSpPr>
-          <p:cNvPr id="399" name="TextBox 40"/>
+          <p:cNvPr id="441" name="TextBox 40"/>
           <p:cNvSpPr txBox="1"/>
           <p:nvPr/>
         </p:nvSpPr>
@@ -19533,7 +20411,7 @@
       </p:sp>
       <p:sp>
         <p:nvSpPr>
-          <p:cNvPr id="400" name="TextBox 28"/>
+          <p:cNvPr id="442" name="TextBox 28"/>
           <p:cNvSpPr txBox="1"/>
           <p:nvPr/>
         </p:nvSpPr>
@@ -19575,7 +20453,7 @@
       </p:sp>
       <p:sp>
         <p:nvSpPr>
-          <p:cNvPr id="401" name="TextBox 29"/>
+          <p:cNvPr id="443" name="TextBox 29"/>
           <p:cNvSpPr txBox="1"/>
           <p:nvPr/>
         </p:nvSpPr>
@@ -19617,7 +20495,7 @@
       </p:sp>
       <p:sp>
         <p:nvSpPr>
-          <p:cNvPr id="402" name="TextBox 31"/>
+          <p:cNvPr id="444" name="TextBox 31"/>
           <p:cNvSpPr txBox="1"/>
           <p:nvPr/>
         </p:nvSpPr>
@@ -19659,7 +20537,7 @@
       </p:sp>
       <p:sp>
         <p:nvSpPr>
-          <p:cNvPr id="403" name="TextBox 32"/>
+          <p:cNvPr id="445" name="TextBox 32"/>
           <p:cNvSpPr txBox="1"/>
           <p:nvPr/>
         </p:nvSpPr>
@@ -19708,7 +20586,7 @@
 </p:sld>
 </file>
 
-<file path=ppt/slides/slide16.xml><?xml version="1.0" encoding="utf-8"?>
+<file path=ppt/slides/slide18.xml><?xml version="1.0" encoding="utf-8"?>
 <p:sld xmlns:a="http://schemas.openxmlformats.org/drawingml/2006/main" xmlns:r="http://schemas.openxmlformats.org/officeDocument/2006/relationships" xmlns:p="http://schemas.openxmlformats.org/presentationml/2006/main" xmlns:m="http://schemas.openxmlformats.org/officeDocument/2006/math" xmlns:a14="http://schemas.microsoft.com/office/drawing/2010/main" showMasterSp="1" showMasterPhAnim="1">
   <p:cSld>
     <p:spTree>
@@ -19727,7 +20605,7 @@
       </p:grpSpPr>
       <p:sp>
         <p:nvSpPr>
-          <p:cNvPr id="405" name="Title 4"/>
+          <p:cNvPr id="447" name="Title 4"/>
           <p:cNvSpPr txBox="1"/>
           <p:nvPr>
             <p:ph type="title"/>
@@ -19755,7 +20633,7 @@
       </p:sp>
       <p:sp>
         <p:nvSpPr>
-          <p:cNvPr id="406" name="Content Placeholder 5"/>
+          <p:cNvPr id="448" name="Content Placeholder 5"/>
           <p:cNvSpPr txBox="1"/>
           <p:nvPr>
             <p:ph type="body" idx="1"/>
@@ -19783,7 +20661,7 @@
       </p:sp>
       <p:sp>
         <p:nvSpPr>
-          <p:cNvPr id="407" name="Slide Number Placeholder 3"/>
+          <p:cNvPr id="449" name="Slide Number Placeholder 3"/>
           <p:cNvSpPr txBox="1"/>
           <p:nvPr>
             <p:ph type="sldNum" sz="quarter" idx="2"/>
@@ -19810,7 +20688,7 @@
       </p:sp>
       <p:pic>
         <p:nvPicPr>
-          <p:cNvPr id="408" name="Picture 2" descr="Picture 2"/>
+          <p:cNvPr id="450" name="Picture 2" descr="Picture 2"/>
           <p:cNvPicPr>
             <a:picLocks noChangeAspect="1"/>
           </p:cNvPicPr>
@@ -19847,7 +20725,7 @@
 </p:sld>
 </file>
 
-<file path=ppt/slides/slide17.xml><?xml version="1.0" encoding="utf-8"?>
+<file path=ppt/slides/slide19.xml><?xml version="1.0" encoding="utf-8"?>
 <p:sld xmlns:a="http://schemas.openxmlformats.org/drawingml/2006/main" xmlns:r="http://schemas.openxmlformats.org/officeDocument/2006/relationships" xmlns:p="http://schemas.openxmlformats.org/presentationml/2006/main" xmlns:m="http://schemas.openxmlformats.org/officeDocument/2006/math" xmlns:a14="http://schemas.microsoft.com/office/drawing/2010/main" showMasterSp="1" showMasterPhAnim="1">
   <p:cSld>
     <p:spTree>
@@ -19866,7 +20744,7 @@
       </p:grpSpPr>
       <p:sp>
         <p:nvSpPr>
-          <p:cNvPr id="410" name="Title 4"/>
+          <p:cNvPr id="452" name="Title 4"/>
           <p:cNvSpPr txBox="1"/>
           <p:nvPr>
             <p:ph type="title"/>
@@ -19894,7 +20772,7 @@
       </p:sp>
       <p:sp>
         <p:nvSpPr>
-          <p:cNvPr id="411" name="Slide Number Placeholder 3"/>
+          <p:cNvPr id="453" name="Slide Number Placeholder 3"/>
           <p:cNvSpPr txBox="1"/>
           <p:nvPr>
             <p:ph type="sldNum" sz="quarter" idx="2"/>
@@ -19921,7 +20799,7 @@
       </p:sp>
       <p:pic>
         <p:nvPicPr>
-          <p:cNvPr id="412" name="Picture 3" descr="Picture 3"/>
+          <p:cNvPr id="454" name="Picture 3" descr="Picture 3"/>
           <p:cNvPicPr>
             <a:picLocks noChangeAspect="1"/>
           </p:cNvPicPr>
@@ -19950,7 +20828,7 @@
       </p:pic>
       <p:sp>
         <p:nvSpPr>
-          <p:cNvPr id="413" name="Content Placeholder 5"/>
+          <p:cNvPr id="455" name="Content Placeholder 5"/>
           <p:cNvSpPr txBox="1"/>
           <p:nvPr>
             <p:ph type="body" idx="1"/>
@@ -19973,175 +20851,6 @@
             <a:r>
               <a:t>Only a small fraction of neutrons arrive, most are simulated in vain</a:t>
             </a:r>
-          </a:p>
-        </p:txBody>
-      </p:sp>
-    </p:spTree>
-  </p:cSld>
-  <p:clrMapOvr>
-    <a:masterClrMapping/>
-  </p:clrMapOvr>
-  <p:transition xmlns:p14="http://schemas.microsoft.com/office/powerpoint/2010/main" spd="med" advClick="1"/>
-</p:sld>
-</file>
-
-<file path=ppt/slides/slide18.xml><?xml version="1.0" encoding="utf-8"?>
-<p:sld xmlns:a="http://schemas.openxmlformats.org/drawingml/2006/main" xmlns:r="http://schemas.openxmlformats.org/officeDocument/2006/relationships" xmlns:p="http://schemas.openxmlformats.org/presentationml/2006/main" xmlns:m="http://schemas.openxmlformats.org/officeDocument/2006/math" xmlns:a14="http://schemas.microsoft.com/office/drawing/2010/main" showMasterSp="1" showMasterPhAnim="1">
-  <p:cSld>
-    <p:spTree>
-      <p:nvGrpSpPr>
-        <p:cNvPr id="1" name=""/>
-        <p:cNvGrpSpPr/>
-        <p:nvPr/>
-      </p:nvGrpSpPr>
-      <p:grpSpPr>
-        <a:xfrm>
-          <a:off x="0" y="0"/>
-          <a:ext cx="0" cy="0"/>
-          <a:chOff x="0" y="0"/>
-          <a:chExt cx="0" cy="0"/>
-        </a:xfrm>
-      </p:grpSpPr>
-      <p:sp>
-        <p:nvSpPr>
-          <p:cNvPr id="415" name="Title 4"/>
-          <p:cNvSpPr txBox="1"/>
-          <p:nvPr>
-            <p:ph type="title"/>
-          </p:nvPr>
-        </p:nvSpPr>
-        <p:spPr>
-          <a:xfrm>
-            <a:off x="1774725" y="426125"/>
-            <a:ext cx="9312376" cy="972718"/>
-          </a:xfrm>
-          <a:prstGeom prst="rect">
-            <a:avLst/>
-          </a:prstGeom>
-        </p:spPr>
-        <p:txBody>
-          <a:bodyPr/>
-          <a:lstStyle/>
-          <a:p>
-            <a:pPr/>
-            <a:r>
-              <a:t>Conclusions</a:t>
-            </a:r>
-          </a:p>
-        </p:txBody>
-      </p:sp>
-      <p:sp>
-        <p:nvSpPr>
-          <p:cNvPr id="416" name="Content Placeholder 5"/>
-          <p:cNvSpPr txBox="1"/>
-          <p:nvPr>
-            <p:ph type="body" idx="1"/>
-          </p:nvPr>
-        </p:nvSpPr>
-        <p:spPr>
-          <a:xfrm>
-            <a:off x="1774725" y="2014562"/>
-            <a:ext cx="9312376" cy="4545580"/>
-          </a:xfrm>
-          <a:prstGeom prst="rect">
-            <a:avLst/>
-          </a:prstGeom>
-        </p:spPr>
-        <p:txBody>
-          <a:bodyPr/>
-          <a:lstStyle/>
-          <a:p>
-            <a:pPr/>
-            <a:r>
-              <a:t>SANS</a:t>
-            </a:r>
-          </a:p>
-          <a:p>
-            <a:pPr lvl="1">
-              <a:buChar char="•"/>
-            </a:pPr>
-            <a:r>
-              <a:t>Lots of choice, many models (challenge can be to decide what to choose)</a:t>
-            </a:r>
-          </a:p>
-          <a:p>
-            <a:pPr lvl="1">
-              <a:buChar char="•"/>
-            </a:pPr>
-          </a:p>
-          <a:p>
-            <a:pPr/>
-            <a:r>
-              <a:t>Reflectometry:</a:t>
-            </a:r>
-          </a:p>
-          <a:p>
-            <a:pPr lvl="1">
-              <a:buChar char="•"/>
-            </a:pPr>
-            <a:r>
-              <a:t>Only little choice, Multilayer_sample or “a mirror”</a:t>
-            </a:r>
-          </a:p>
-          <a:p>
-            <a:pPr/>
-          </a:p>
-          <a:p>
-            <a:pPr/>
-            <a:r>
-              <a:t>Inelastic scattering</a:t>
-            </a:r>
-          </a:p>
-          <a:p>
-            <a:pPr lvl="1">
-              <a:buChar char="•"/>
-            </a:pPr>
-            <a:r>
-              <a:t>Inelastic scattering supported in McStas, not all cases fully covered</a:t>
-            </a:r>
-          </a:p>
-          <a:p>
-            <a:pPr lvl="1">
-              <a:buChar char="•"/>
-            </a:pPr>
-            <a:r>
-              <a:t>Longer computational times required</a:t>
-            </a:r>
-          </a:p>
-          <a:p>
-            <a:pPr lvl="1">
-              <a:buChar char="•"/>
-            </a:pPr>
-            <a:r>
-              <a:t>Advantages from simulation especially important for spectroscopy (resolution function)</a:t>
-            </a:r>
-          </a:p>
-        </p:txBody>
-      </p:sp>
-      <p:sp>
-        <p:nvSpPr>
-          <p:cNvPr id="417" name="Slide Number Placeholder 3"/>
-          <p:cNvSpPr txBox="1"/>
-          <p:nvPr>
-            <p:ph type="sldNum" sz="quarter" idx="2"/>
-          </p:nvPr>
-        </p:nvSpPr>
-        <p:spPr>
-          <a:prstGeom prst="rect">
-            <a:avLst/>
-          </a:prstGeom>
-          <a:extLst>
-            <a:ext uri="{C572A759-6A51-4108-AA02-DFA0A04FC94B}">
-              <ma14:wrappingTextBoxFlag xmlns:ma14="http://schemas.microsoft.com/office/mac/drawingml/2011/main" val="1"/>
-            </a:ext>
-          </a:extLst>
-        </p:spPr>
-        <p:txBody>
-          <a:bodyPr/>
-          <a:lstStyle/>
-          <a:p>
-            <a:pPr/>
-            <a:fld id="{86CB4B4D-7CA3-9044-876B-883B54F8677D}" type="slidenum"/>
           </a:p>
         </p:txBody>
       </p:sp>
@@ -20173,7 +20882,7 @@
       </p:grpSpPr>
       <p:sp>
         <p:nvSpPr>
-          <p:cNvPr id="293" name="Title 4"/>
+          <p:cNvPr id="292" name="Title 4"/>
           <p:cNvSpPr txBox="1"/>
           <p:nvPr>
             <p:ph type="title"/>
@@ -20201,7 +20910,7 @@
       </p:sp>
       <p:sp>
         <p:nvSpPr>
-          <p:cNvPr id="294" name="Content Placeholder 5"/>
+          <p:cNvPr id="293" name="Content Placeholder 5"/>
           <p:cNvSpPr txBox="1"/>
           <p:nvPr>
             <p:ph type="body" idx="1"/>
@@ -20281,7 +20990,191 @@
       </p:sp>
       <p:sp>
         <p:nvSpPr>
-          <p:cNvPr id="295" name="Slide Number Placeholder 3"/>
+          <p:cNvPr id="294" name="Slide Number Placeholder 3"/>
+          <p:cNvSpPr txBox="1"/>
+          <p:nvPr>
+            <p:ph type="sldNum" sz="quarter" idx="2"/>
+          </p:nvPr>
+        </p:nvSpPr>
+        <p:spPr>
+          <a:prstGeom prst="rect">
+            <a:avLst/>
+          </a:prstGeom>
+          <a:extLst>
+            <a:ext uri="{C572A759-6A51-4108-AA02-DFA0A04FC94B}">
+              <ma14:wrappingTextBoxFlag xmlns:ma14="http://schemas.microsoft.com/office/mac/drawingml/2011/main" val="1"/>
+            </a:ext>
+          </a:extLst>
+        </p:spPr>
+        <p:txBody>
+          <a:bodyPr/>
+          <a:lstStyle/>
+          <a:p>
+            <a:pPr/>
+            <a:fld id="{86CB4B4D-7CA3-9044-876B-883B54F8677D}" type="slidenum"/>
+          </a:p>
+        </p:txBody>
+      </p:sp>
+    </p:spTree>
+  </p:cSld>
+  <p:clrMapOvr>
+    <a:masterClrMapping/>
+  </p:clrMapOvr>
+  <p:transition xmlns:p14="http://schemas.microsoft.com/office/powerpoint/2010/main" spd="med" advClick="1"/>
+</p:sld>
+</file>
+
+<file path=ppt/slides/slide20.xml><?xml version="1.0" encoding="utf-8"?>
+<p:sld xmlns:a="http://schemas.openxmlformats.org/drawingml/2006/main" xmlns:r="http://schemas.openxmlformats.org/officeDocument/2006/relationships" xmlns:p="http://schemas.openxmlformats.org/presentationml/2006/main" xmlns:m="http://schemas.openxmlformats.org/officeDocument/2006/math" xmlns:a14="http://schemas.microsoft.com/office/drawing/2010/main" showMasterSp="1" showMasterPhAnim="1">
+  <p:cSld>
+    <p:spTree>
+      <p:nvGrpSpPr>
+        <p:cNvPr id="1" name=""/>
+        <p:cNvGrpSpPr/>
+        <p:nvPr/>
+      </p:nvGrpSpPr>
+      <p:grpSpPr>
+        <a:xfrm>
+          <a:off x="0" y="0"/>
+          <a:ext cx="0" cy="0"/>
+          <a:chOff x="0" y="0"/>
+          <a:chExt cx="0" cy="0"/>
+        </a:xfrm>
+      </p:grpSpPr>
+      <p:sp>
+        <p:nvSpPr>
+          <p:cNvPr id="457" name="Title 4"/>
+          <p:cNvSpPr txBox="1"/>
+          <p:nvPr>
+            <p:ph type="title"/>
+          </p:nvPr>
+        </p:nvSpPr>
+        <p:spPr>
+          <a:xfrm>
+            <a:off x="1774725" y="426125"/>
+            <a:ext cx="9312376" cy="972718"/>
+          </a:xfrm>
+          <a:prstGeom prst="rect">
+            <a:avLst/>
+          </a:prstGeom>
+        </p:spPr>
+        <p:txBody>
+          <a:bodyPr/>
+          <a:lstStyle/>
+          <a:p>
+            <a:pPr/>
+            <a:r>
+              <a:t>Conclusions</a:t>
+            </a:r>
+          </a:p>
+        </p:txBody>
+      </p:sp>
+      <p:sp>
+        <p:nvSpPr>
+          <p:cNvPr id="458" name="Content Placeholder 5"/>
+          <p:cNvSpPr txBox="1"/>
+          <p:nvPr>
+            <p:ph type="body" idx="1"/>
+          </p:nvPr>
+        </p:nvSpPr>
+        <p:spPr>
+          <a:xfrm>
+            <a:off x="1774725" y="2014562"/>
+            <a:ext cx="9312376" cy="4545580"/>
+          </a:xfrm>
+          <a:prstGeom prst="rect">
+            <a:avLst/>
+          </a:prstGeom>
+        </p:spPr>
+        <p:txBody>
+          <a:bodyPr/>
+          <a:lstStyle/>
+          <a:p>
+            <a:pPr/>
+            <a:r>
+              <a:t>SANS</a:t>
+            </a:r>
+          </a:p>
+          <a:p>
+            <a:pPr lvl="1">
+              <a:buChar char="•"/>
+            </a:pPr>
+            <a:r>
+              <a:t>Lots of choice, many models (challenge can be to decide what to choose)</a:t>
+            </a:r>
+          </a:p>
+          <a:p>
+            <a:pPr lvl="1">
+              <a:buChar char="•"/>
+            </a:pPr>
+          </a:p>
+          <a:p>
+            <a:pPr/>
+            <a:r>
+              <a:t>Reflectometry:</a:t>
+            </a:r>
+          </a:p>
+          <a:p>
+            <a:pPr lvl="1">
+              <a:buChar char="•"/>
+            </a:pPr>
+            <a:r>
+              <a:t>Only little choice, Multilayer_sample or “a mirror”</a:t>
+            </a:r>
+            <a:br/>
+          </a:p>
+          <a:p>
+            <a:pPr/>
+            <a:r>
+              <a:t>Imaging:</a:t>
+            </a:r>
+          </a:p>
+          <a:p>
+            <a:pPr lvl="1">
+              <a:buChar char="•"/>
+            </a:pPr>
+            <a:r>
+              <a:t>Single-phase “blocks” of material, new developments are in the pipe</a:t>
+            </a:r>
+          </a:p>
+          <a:p>
+            <a:pPr/>
+          </a:p>
+          <a:p>
+            <a:pPr/>
+            <a:r>
+              <a:t>Inelastic scattering</a:t>
+            </a:r>
+          </a:p>
+          <a:p>
+            <a:pPr lvl="1">
+              <a:buChar char="•"/>
+            </a:pPr>
+            <a:r>
+              <a:t>Inelastic scattering supported in McStas, not all cases fully covered</a:t>
+            </a:r>
+          </a:p>
+          <a:p>
+            <a:pPr lvl="1">
+              <a:buChar char="•"/>
+            </a:pPr>
+            <a:r>
+              <a:t>Longer computational times required</a:t>
+            </a:r>
+          </a:p>
+          <a:p>
+            <a:pPr lvl="1">
+              <a:buChar char="•"/>
+            </a:pPr>
+            <a:r>
+              <a:t>Advantages from simulation especially important for spectroscopy (resolution function)</a:t>
+            </a:r>
+          </a:p>
+        </p:txBody>
+      </p:sp>
+      <p:sp>
+        <p:nvSpPr>
+          <p:cNvPr id="459" name="Slide Number Placeholder 3"/>
           <p:cNvSpPr txBox="1"/>
           <p:nvPr>
             <p:ph type="sldNum" sz="quarter" idx="2"/>
@@ -20334,7 +21227,7 @@
       </p:grpSpPr>
       <p:pic>
         <p:nvPicPr>
-          <p:cNvPr id="297" name="Picture 4" descr="Picture 4"/>
+          <p:cNvPr id="296" name="Picture 4" descr="Picture 4"/>
           <p:cNvPicPr>
             <a:picLocks noChangeAspect="1"/>
           </p:cNvPicPr>
@@ -20363,7 +21256,7 @@
       </p:pic>
       <p:sp>
         <p:nvSpPr>
-          <p:cNvPr id="298" name="Slide Number"/>
+          <p:cNvPr id="297" name="Slide Number"/>
           <p:cNvSpPr txBox="1"/>
           <p:nvPr>
             <p:ph type="sldNum" sz="quarter" idx="2"/>
@@ -20390,7 +21283,7 @@
       </p:sp>
       <p:sp>
         <p:nvSpPr>
-          <p:cNvPr id="299" name="TextShape 1"/>
+          <p:cNvPr id="298" name="TextShape 1"/>
           <p:cNvSpPr txBox="1"/>
           <p:nvPr/>
         </p:nvSpPr>
@@ -20430,7 +21323,7 @@
       </p:sp>
       <p:pic>
         <p:nvPicPr>
-          <p:cNvPr id="300" name="Picture 3" descr="Picture 3"/>
+          <p:cNvPr id="299" name="Picture 3" descr="Picture 3"/>
           <p:cNvPicPr>
             <a:picLocks noChangeAspect="1"/>
           </p:cNvPicPr>
@@ -20459,7 +21352,7 @@
       </p:pic>
       <p:sp>
         <p:nvSpPr>
-          <p:cNvPr id="301" name="CustomShape 2"/>
+          <p:cNvPr id="300" name="CustomShape 2"/>
           <p:cNvSpPr txBox="1"/>
           <p:nvPr/>
         </p:nvSpPr>
@@ -20531,7 +21424,7 @@
       </p:sp>
       <p:sp>
         <p:nvSpPr>
-          <p:cNvPr id="302" name="TextShape 2"/>
+          <p:cNvPr id="301" name="TextShape 2"/>
           <p:cNvSpPr txBox="1"/>
           <p:nvPr/>
         </p:nvSpPr>
@@ -20707,7 +21600,7 @@
       </p:sp>
       <p:grpSp>
         <p:nvGrpSpPr>
-          <p:cNvPr id="305" name="Group"/>
+          <p:cNvPr id="304" name="Group"/>
           <p:cNvGrpSpPr/>
           <p:nvPr/>
         </p:nvGrpSpPr>
@@ -20721,7 +21614,7 @@
         </p:grpSpPr>
         <p:pic>
           <p:nvPicPr>
-            <p:cNvPr id="303" name="Picture 6" descr="Picture 6"/>
+            <p:cNvPr id="302" name="Picture 6" descr="Picture 6"/>
             <p:cNvPicPr>
               <a:picLocks noChangeAspect="1"/>
             </p:cNvPicPr>
@@ -20752,7 +21645,7 @@
         </p:pic>
         <p:pic>
           <p:nvPicPr>
-            <p:cNvPr id="304" name="Picture 7" descr="Picture 7"/>
+            <p:cNvPr id="303" name="Picture 7" descr="Picture 7"/>
             <p:cNvPicPr>
               <a:picLocks noChangeAspect="1"/>
             </p:cNvPicPr>
@@ -20810,7 +21703,7 @@
       </p:grpSpPr>
       <p:sp>
         <p:nvSpPr>
-          <p:cNvPr id="307" name="SANS models in McStas"/>
+          <p:cNvPr id="306" name="SANS models in McStas"/>
           <p:cNvSpPr txBox="1"/>
           <p:nvPr>
             <p:ph type="title"/>
@@ -20834,7 +21727,7 @@
       </p:sp>
       <p:sp>
         <p:nvSpPr>
-          <p:cNvPr id="308" name="Slide Number"/>
+          <p:cNvPr id="307" name="Slide Number"/>
           <p:cNvSpPr txBox="1"/>
           <p:nvPr>
             <p:ph type="sldNum" sz="quarter" idx="2"/>
@@ -20861,7 +21754,7 @@
       </p:sp>
       <p:pic>
         <p:nvPicPr>
-          <p:cNvPr id="309" name="Screenshot 2021-05-05 at 21.56.51.png" descr="Screenshot 2021-05-05 at 21.56.51.png"/>
+          <p:cNvPr id="308" name="Screenshot 2021-05-05 at 21.56.51.png" descr="Screenshot 2021-05-05 at 21.56.51.png"/>
           <p:cNvPicPr>
             <a:picLocks noChangeAspect="1"/>
           </p:cNvPicPr>
@@ -20916,7 +21809,7 @@
       </p:grpSpPr>
       <p:sp>
         <p:nvSpPr>
-          <p:cNvPr id="311" name="Slide Number"/>
+          <p:cNvPr id="310" name="Slide Number"/>
           <p:cNvSpPr txBox="1"/>
           <p:nvPr>
             <p:ph type="sldNum" sz="quarter" idx="2"/>
@@ -20943,7 +21836,7 @@
       </p:sp>
       <p:sp>
         <p:nvSpPr>
-          <p:cNvPr id="312" name="TextShape 1"/>
+          <p:cNvPr id="311" name="TextShape 1"/>
           <p:cNvSpPr txBox="1"/>
           <p:nvPr/>
         </p:nvSpPr>
@@ -20983,7 +21876,7 @@
       </p:sp>
       <p:pic>
         <p:nvPicPr>
-          <p:cNvPr id="313" name="image156.png" descr="image156.png"/>
+          <p:cNvPr id="312" name="image156.png" descr="image156.png"/>
           <p:cNvPicPr>
             <a:picLocks noChangeAspect="1"/>
           </p:cNvPicPr>
@@ -21012,7 +21905,7 @@
       </p:pic>
       <p:sp>
         <p:nvSpPr>
-          <p:cNvPr id="314" name="CustomShape 2"/>
+          <p:cNvPr id="313" name="CustomShape 2"/>
           <p:cNvSpPr/>
           <p:nvPr/>
         </p:nvSpPr>
@@ -21040,7 +21933,7 @@
       </p:sp>
       <p:sp>
         <p:nvSpPr>
-          <p:cNvPr id="315" name="TextShape 3"/>
+          <p:cNvPr id="314" name="TextShape 3"/>
           <p:cNvSpPr txBox="1"/>
           <p:nvPr/>
         </p:nvSpPr>
@@ -21108,7 +22001,7 @@
       </p:grpSpPr>
       <p:sp>
         <p:nvSpPr>
-          <p:cNvPr id="317" name="Reflectometry"/>
+          <p:cNvPr id="316" name="Reflectometry"/>
           <p:cNvSpPr txBox="1"/>
           <p:nvPr>
             <p:ph type="title"/>
@@ -21136,7 +22029,7 @@
       </p:sp>
       <p:sp>
         <p:nvSpPr>
-          <p:cNvPr id="318" name="Used to probe properties of surfaces and interfaces - solids and liquids"/>
+          <p:cNvPr id="317" name="Used to probe properties of surfaces and interfaces - solids and liquids"/>
           <p:cNvSpPr txBox="1"/>
           <p:nvPr>
             <p:ph type="body" idx="1"/>
@@ -21164,7 +22057,7 @@
       </p:sp>
       <p:sp>
         <p:nvSpPr>
-          <p:cNvPr id="319" name="Slide Number"/>
+          <p:cNvPr id="318" name="Slide Number"/>
           <p:cNvSpPr txBox="1"/>
           <p:nvPr>
             <p:ph type="sldNum" sz="quarter" idx="2"/>
@@ -21191,7 +22084,7 @@
       </p:sp>
       <p:pic>
         <p:nvPicPr>
-          <p:cNvPr id="320" name="Screenshot 2021-05-05 at 22.24.00.png" descr="Screenshot 2021-05-05 at 22.24.00.png"/>
+          <p:cNvPr id="319" name="Screenshot 2021-05-05 at 22.24.00.png" descr="Screenshot 2021-05-05 at 22.24.00.png"/>
           <p:cNvPicPr>
             <a:picLocks noChangeAspect="1"/>
           </p:cNvPicPr>
@@ -21246,7 +22139,7 @@
       </p:grpSpPr>
       <p:sp>
         <p:nvSpPr>
-          <p:cNvPr id="322" name="Reflectometry samples in McStas"/>
+          <p:cNvPr id="321" name="Reflectometry samples in McStas"/>
           <p:cNvSpPr txBox="1"/>
           <p:nvPr>
             <p:ph type="title"/>
@@ -21270,7 +22163,7 @@
       </p:sp>
       <p:sp>
         <p:nvSpPr>
-          <p:cNvPr id="323" name="Double-click to edit"/>
+          <p:cNvPr id="322" name="Double-click to edit"/>
           <p:cNvSpPr txBox="1"/>
           <p:nvPr>
             <p:ph type="body" idx="1"/>
@@ -21291,7 +22184,7 @@
       </p:sp>
       <p:sp>
         <p:nvSpPr>
-          <p:cNvPr id="324" name="Slide Number"/>
+          <p:cNvPr id="323" name="Slide Number"/>
           <p:cNvSpPr txBox="1"/>
           <p:nvPr>
             <p:ph type="sldNum" sz="quarter" idx="2"/>
@@ -21318,7 +22211,7 @@
       </p:sp>
       <p:pic>
         <p:nvPicPr>
-          <p:cNvPr id="325" name="Screenshot 2021-05-05 at 21.57.00.png" descr="Screenshot 2021-05-05 at 21.57.00.png"/>
+          <p:cNvPr id="324" name="Screenshot 2021-05-05 at 21.57.00.png" descr="Screenshot 2021-05-05 at 21.57.00.png"/>
           <p:cNvPicPr>
             <a:picLocks noChangeAspect="1"/>
           </p:cNvPicPr>
@@ -21347,7 +22240,7 @@
       </p:pic>
       <p:pic>
         <p:nvPicPr>
-          <p:cNvPr id="326" name="Screenshot 2021-05-05 at 22.25.17.png" descr="Screenshot 2021-05-05 at 22.25.17.png"/>
+          <p:cNvPr id="325" name="Screenshot 2021-05-05 at 22.25.17.png" descr="Screenshot 2021-05-05 at 22.25.17.png"/>
           <p:cNvPicPr>
             <a:picLocks noChangeAspect="1"/>
           </p:cNvPicPr>
@@ -21402,7 +22295,7 @@
       </p:grpSpPr>
       <p:sp>
         <p:nvSpPr>
-          <p:cNvPr id="328" name="Example: Multilayer_sample"/>
+          <p:cNvPr id="327" name="Example: Multilayer_sample"/>
           <p:cNvSpPr txBox="1"/>
           <p:nvPr>
             <p:ph type="title"/>
@@ -21430,7 +22323,7 @@
       </p:sp>
       <p:sp>
         <p:nvSpPr>
-          <p:cNvPr id="329" name="Double-click to edit"/>
+          <p:cNvPr id="328" name="Double-click to edit"/>
           <p:cNvSpPr txBox="1"/>
           <p:nvPr>
             <p:ph type="body" idx="1"/>
@@ -21451,7 +22344,7 @@
       </p:sp>
       <p:sp>
         <p:nvSpPr>
-          <p:cNvPr id="330" name="Slide Number"/>
+          <p:cNvPr id="329" name="Slide Number"/>
           <p:cNvSpPr txBox="1"/>
           <p:nvPr>
             <p:ph type="sldNum" sz="quarter" idx="2"/>
@@ -21478,7 +22371,7 @@
       </p:sp>
       <p:pic>
         <p:nvPicPr>
-          <p:cNvPr id="331" name="Screenshot 2021-05-05 at 22.28.39.png" descr="Screenshot 2021-05-05 at 22.28.39.png"/>
+          <p:cNvPr id="330" name="Screenshot 2021-05-05 at 22.28.39.png" descr="Screenshot 2021-05-05 at 22.28.39.png"/>
           <p:cNvPicPr>
             <a:picLocks noChangeAspect="1"/>
           </p:cNvPicPr>
@@ -21531,109 +22424,9 @@
           <a:chExt cx="0" cy="0"/>
         </a:xfrm>
       </p:grpSpPr>
-      <p:pic>
-        <p:nvPicPr>
-          <p:cNvPr id="333" name="Screenshot 2021-05-05 at 22.08.43.png" descr="Screenshot 2021-05-05 at 22.08.43.png"/>
-          <p:cNvPicPr>
-            <a:picLocks noChangeAspect="1"/>
-          </p:cNvPicPr>
-          <p:nvPr/>
-        </p:nvPicPr>
-        <p:blipFill>
-          <a:blip r:embed="rId2">
-            <a:extLst/>
-          </a:blip>
-          <a:stretch>
-            <a:fillRect/>
-          </a:stretch>
-        </p:blipFill>
-        <p:spPr>
-          <a:xfrm>
-            <a:off x="5348679" y="893846"/>
-            <a:ext cx="6750113" cy="2778736"/>
-          </a:xfrm>
-          <a:prstGeom prst="rect">
-            <a:avLst/>
-          </a:prstGeom>
-          <a:ln w="12700">
-            <a:miter lim="400000"/>
-          </a:ln>
-        </p:spPr>
-      </p:pic>
       <p:sp>
         <p:nvSpPr>
-          <p:cNvPr id="334" name="Title 4"/>
-          <p:cNvSpPr txBox="1"/>
-          <p:nvPr>
-            <p:ph type="title"/>
-          </p:nvPr>
-        </p:nvSpPr>
-        <p:spPr>
-          <a:xfrm>
-            <a:off x="1774725" y="426125"/>
-            <a:ext cx="9312376" cy="972718"/>
-          </a:xfrm>
-          <a:prstGeom prst="rect">
-            <a:avLst/>
-          </a:prstGeom>
-        </p:spPr>
-        <p:txBody>
-          <a:bodyPr/>
-          <a:lstStyle/>
-          <a:p>
-            <a:pPr/>
-            <a:r>
-              <a:t>Inelastic scattering S(q,w)</a:t>
-            </a:r>
-          </a:p>
-        </p:txBody>
-      </p:sp>
-      <p:sp>
-        <p:nvSpPr>
-          <p:cNvPr id="335" name="Content Placeholder 5"/>
-          <p:cNvSpPr txBox="1"/>
-          <p:nvPr>
-            <p:ph type="body" idx="1"/>
-          </p:nvPr>
-        </p:nvSpPr>
-        <p:spPr>
-          <a:xfrm>
-            <a:off x="1774799" y="1706398"/>
-            <a:ext cx="9312376" cy="4545581"/>
-          </a:xfrm>
-          <a:prstGeom prst="rect">
-            <a:avLst/>
-          </a:prstGeom>
-        </p:spPr>
-        <p:txBody>
-          <a:bodyPr/>
-          <a:lstStyle/>
-          <a:p>
-            <a:pPr/>
-            <a:r>
-              <a:t>Partial differential cross section</a:t>
-            </a:r>
-          </a:p>
-          <a:p>
-            <a:pPr/>
-            <a:r>
-              <a:t>Scattering function</a:t>
-            </a:r>
-          </a:p>
-          <a:p>
-            <a:pPr/>
-          </a:p>
-          <a:p>
-            <a:pPr/>
-            <a:r>
-              <a:t>Phonons, Spin waves, … </a:t>
-            </a:r>
-          </a:p>
-        </p:txBody>
-      </p:sp>
-      <p:sp>
-        <p:nvSpPr>
-          <p:cNvPr id="336" name="Slide Number Placeholder 3"/>
+          <p:cNvPr id="332" name="Slide Number"/>
           <p:cNvSpPr txBox="1"/>
           <p:nvPr>
             <p:ph type="sldNum" sz="quarter" idx="2"/>
@@ -21658,9 +22451,130 @@
           </a:p>
         </p:txBody>
       </p:sp>
+      <p:sp>
+        <p:nvSpPr>
+          <p:cNvPr id="333" name="CustomShape 1"/>
+          <p:cNvSpPr txBox="1"/>
+          <p:nvPr/>
+        </p:nvSpPr>
+        <p:spPr>
+          <a:xfrm>
+            <a:off x="1721308" y="411648"/>
+            <a:ext cx="8332982" cy="851137"/>
+          </a:xfrm>
+          <a:prstGeom prst="rect">
+            <a:avLst/>
+          </a:prstGeom>
+          <a:ln w="12700">
+            <a:miter lim="400000"/>
+          </a:ln>
+          <a:extLst>
+            <a:ext uri="{C572A759-6A51-4108-AA02-DFA0A04FC94B}">
+              <ma14:wrappingTextBoxFlag xmlns:ma14="http://schemas.microsoft.com/office/mac/drawingml/2011/main" val="1"/>
+            </a:ext>
+          </a:extLst>
+        </p:spPr>
+        <p:txBody>
+          <a:bodyPr lIns="0" tIns="0" rIns="0" bIns="0">
+            <a:spAutoFit/>
+          </a:bodyPr>
+          <a:lstStyle/>
+          <a:p>
+            <a:pPr>
+              <a:defRPr spc="0" sz="3000"/>
+            </a:pPr>
+            <a:r>
+              <a:t>Absorption Imaging - simple shapes or OFF’s of</a:t>
+            </a:r>
+            <a:br/>
+            <a:r>
+              <a:t>single-phase material blocks</a:t>
+            </a:r>
+          </a:p>
+        </p:txBody>
+      </p:sp>
+      <p:sp>
+        <p:nvSpPr>
+          <p:cNvPr id="334" name="CustomShape 2"/>
+          <p:cNvSpPr txBox="1"/>
+          <p:nvPr/>
+        </p:nvSpPr>
+        <p:spPr>
+          <a:xfrm>
+            <a:off x="1717762" y="1354772"/>
+            <a:ext cx="8139389" cy="1050824"/>
+          </a:xfrm>
+          <a:prstGeom prst="rect">
+            <a:avLst/>
+          </a:prstGeom>
+          <a:ln w="12700">
+            <a:miter lim="400000"/>
+          </a:ln>
+          <a:extLst>
+            <a:ext uri="{C572A759-6A51-4108-AA02-DFA0A04FC94B}">
+              <ma14:wrappingTextBoxFlag xmlns:ma14="http://schemas.microsoft.com/office/mac/drawingml/2011/main" val="1"/>
+            </a:ext>
+          </a:extLst>
+        </p:spPr>
+        <p:txBody>
+          <a:bodyPr lIns="0" tIns="0" rIns="0" bIns="0">
+            <a:spAutoFit/>
+          </a:bodyPr>
+          <a:lstStyle/>
+          <a:p>
+            <a:pPr>
+              <a:defRPr spc="0" sz="1400"/>
+            </a:pPr>
+            <a:r>
+              <a:t>An additional complex geometry enables to use any point set to describe the material volume (</a:t>
+            </a:r>
+            <a:r>
+              <a:rPr i="1"/>
+              <a:t>geomview </a:t>
+            </a:r>
+            <a:r>
+              <a:t>OFF file). </a:t>
+            </a:r>
+          </a:p>
+          <a:p>
+            <a:pPr>
+              <a:defRPr spc="0" sz="1400"/>
+            </a:pPr>
+          </a:p>
+        </p:txBody>
+      </p:sp>
       <p:pic>
         <p:nvPicPr>
-          <p:cNvPr id="337" name="Picture 2" descr="Picture 2"/>
+          <p:cNvPr id="335" name="image148.png" descr="image148.png"/>
+          <p:cNvPicPr>
+            <a:picLocks noChangeAspect="1"/>
+          </p:cNvPicPr>
+          <p:nvPr/>
+        </p:nvPicPr>
+        <p:blipFill>
+          <a:blip r:embed="rId2">
+            <a:extLst/>
+          </a:blip>
+          <a:stretch>
+            <a:fillRect/>
+          </a:stretch>
+        </p:blipFill>
+        <p:spPr>
+          <a:xfrm>
+            <a:off x="7846619" y="2472362"/>
+            <a:ext cx="2967333" cy="3743662"/>
+          </a:xfrm>
+          <a:prstGeom prst="rect">
+            <a:avLst/>
+          </a:prstGeom>
+          <a:ln w="12700">
+            <a:miter lim="400000"/>
+          </a:ln>
+        </p:spPr>
+      </p:pic>
+      <p:pic>
+        <p:nvPicPr>
+          <p:cNvPr id="336" name="image149.png" descr="image149.png"/>
           <p:cNvPicPr>
             <a:picLocks noChangeAspect="1"/>
           </p:cNvPicPr>
@@ -21676,8 +22590,8 @@
         </p:blipFill>
         <p:spPr>
           <a:xfrm>
-            <a:off x="3115753" y="3726038"/>
-            <a:ext cx="3745649" cy="876387"/>
+            <a:off x="5159695" y="4211615"/>
+            <a:ext cx="2073347" cy="2323653"/>
           </a:xfrm>
           <a:prstGeom prst="rect">
             <a:avLst/>
@@ -21689,7 +22603,7 @@
       </p:pic>
       <p:pic>
         <p:nvPicPr>
-          <p:cNvPr id="338" name="Picture 4" descr="Picture 4"/>
+          <p:cNvPr id="337" name="image150.png" descr="image150.png"/>
           <p:cNvPicPr>
             <a:picLocks noChangeAspect="1"/>
           </p:cNvPicPr>
@@ -21705,8 +22619,8 @@
         </p:blipFill>
         <p:spPr>
           <a:xfrm>
-            <a:off x="3537272" y="4602424"/>
-            <a:ext cx="6359081" cy="776108"/>
+            <a:off x="2171397" y="3444347"/>
+            <a:ext cx="2490100" cy="2633422"/>
           </a:xfrm>
           <a:prstGeom prst="rect">
             <a:avLst/>
@@ -21716,6 +22630,414 @@
           </a:ln>
         </p:spPr>
       </p:pic>
+      <p:sp>
+        <p:nvSpPr>
+          <p:cNvPr id="338" name="Rectangle"/>
+          <p:cNvSpPr/>
+          <p:nvPr/>
+        </p:nvSpPr>
+        <p:spPr>
+          <a:xfrm>
+            <a:off x="2374955" y="2322035"/>
+            <a:ext cx="2145975" cy="947317"/>
+          </a:xfrm>
+          <a:prstGeom prst="rect">
+            <a:avLst/>
+          </a:prstGeom>
+          <a:solidFill>
+            <a:srgbClr val="FFFFFF"/>
+          </a:solidFill>
+          <a:ln w="25400">
+            <a:solidFill>
+              <a:schemeClr val="accent1"/>
+            </a:solidFill>
+          </a:ln>
+        </p:spPr>
+        <p:txBody>
+          <a:bodyPr lIns="46799" tIns="46799" rIns="46799" bIns="46799" anchor="ctr"/>
+          <a:lstStyle/>
+          <a:p>
+            <a:pPr/>
+          </a:p>
+        </p:txBody>
+      </p:sp>
+      <p:sp>
+        <p:nvSpPr>
+          <p:cNvPr id="339" name="Line"/>
+          <p:cNvSpPr/>
+          <p:nvPr/>
+        </p:nvSpPr>
+        <p:spPr>
+          <a:xfrm flipV="1">
+            <a:off x="2369039" y="2081788"/>
+            <a:ext cx="244825" cy="244825"/>
+          </a:xfrm>
+          <a:prstGeom prst="line">
+            <a:avLst/>
+          </a:prstGeom>
+          <a:ln w="25400">
+            <a:solidFill>
+              <a:schemeClr val="accent1"/>
+            </a:solidFill>
+          </a:ln>
+        </p:spPr>
+        <p:txBody>
+          <a:bodyPr lIns="45719" rIns="45719"/>
+          <a:lstStyle/>
+          <a:p>
+            <a:pPr/>
+          </a:p>
+        </p:txBody>
+      </p:sp>
+      <p:sp>
+        <p:nvSpPr>
+          <p:cNvPr id="340" name="Line"/>
+          <p:cNvSpPr/>
+          <p:nvPr/>
+        </p:nvSpPr>
+        <p:spPr>
+          <a:xfrm flipV="1">
+            <a:off x="4520761" y="3015312"/>
+            <a:ext cx="244825" cy="244825"/>
+          </a:xfrm>
+          <a:prstGeom prst="line">
+            <a:avLst/>
+          </a:prstGeom>
+          <a:ln w="25400">
+            <a:solidFill>
+              <a:schemeClr val="accent1"/>
+            </a:solidFill>
+          </a:ln>
+        </p:spPr>
+        <p:txBody>
+          <a:bodyPr lIns="45719" rIns="45719"/>
+          <a:lstStyle/>
+          <a:p>
+            <a:pPr/>
+          </a:p>
+        </p:txBody>
+      </p:sp>
+      <p:sp>
+        <p:nvSpPr>
+          <p:cNvPr id="341" name="Line"/>
+          <p:cNvSpPr/>
+          <p:nvPr/>
+        </p:nvSpPr>
+        <p:spPr>
+          <a:xfrm flipV="1">
+            <a:off x="4520761" y="2081788"/>
+            <a:ext cx="244825" cy="244825"/>
+          </a:xfrm>
+          <a:prstGeom prst="line">
+            <a:avLst/>
+          </a:prstGeom>
+          <a:ln w="25400">
+            <a:solidFill>
+              <a:schemeClr val="accent1"/>
+            </a:solidFill>
+          </a:ln>
+        </p:spPr>
+        <p:txBody>
+          <a:bodyPr lIns="45719" rIns="45719"/>
+          <a:lstStyle/>
+          <a:p>
+            <a:pPr/>
+          </a:p>
+        </p:txBody>
+      </p:sp>
+      <p:sp>
+        <p:nvSpPr>
+          <p:cNvPr id="342" name="Line"/>
+          <p:cNvSpPr/>
+          <p:nvPr/>
+        </p:nvSpPr>
+        <p:spPr>
+          <a:xfrm flipV="1">
+            <a:off x="4752846" y="2104455"/>
+            <a:ext cx="1" cy="916975"/>
+          </a:xfrm>
+          <a:prstGeom prst="line">
+            <a:avLst/>
+          </a:prstGeom>
+          <a:ln w="25400">
+            <a:solidFill>
+              <a:schemeClr val="accent1"/>
+            </a:solidFill>
+          </a:ln>
+        </p:spPr>
+        <p:txBody>
+          <a:bodyPr lIns="45719" rIns="45719"/>
+          <a:lstStyle/>
+          <a:p>
+            <a:pPr/>
+          </a:p>
+        </p:txBody>
+      </p:sp>
+      <p:sp>
+        <p:nvSpPr>
+          <p:cNvPr id="343" name="Line"/>
+          <p:cNvSpPr/>
+          <p:nvPr/>
+        </p:nvSpPr>
+        <p:spPr>
+          <a:xfrm flipH="1" flipV="1">
+            <a:off x="2594858" y="2086185"/>
+            <a:ext cx="2171375" cy="1"/>
+          </a:xfrm>
+          <a:prstGeom prst="line">
+            <a:avLst/>
+          </a:prstGeom>
+          <a:ln w="25400">
+            <a:solidFill>
+              <a:schemeClr val="accent1"/>
+            </a:solidFill>
+          </a:ln>
+        </p:spPr>
+        <p:txBody>
+          <a:bodyPr lIns="45719" rIns="45719"/>
+          <a:lstStyle/>
+          <a:p>
+            <a:pPr/>
+          </a:p>
+        </p:txBody>
+      </p:sp>
+      <p:sp>
+        <p:nvSpPr>
+          <p:cNvPr id="344" name="Oval"/>
+          <p:cNvSpPr/>
+          <p:nvPr/>
+        </p:nvSpPr>
+        <p:spPr>
+          <a:xfrm>
+            <a:off x="5019028" y="2089284"/>
+            <a:ext cx="987675" cy="947317"/>
+          </a:xfrm>
+          <a:prstGeom prst="ellipse">
+            <a:avLst/>
+          </a:prstGeom>
+          <a:solidFill>
+            <a:srgbClr val="FFFFFF"/>
+          </a:solidFill>
+          <a:ln w="25400">
+            <a:solidFill>
+              <a:schemeClr val="accent1"/>
+            </a:solidFill>
+          </a:ln>
+        </p:spPr>
+        <p:txBody>
+          <a:bodyPr lIns="46799" tIns="46799" rIns="46799" bIns="46799" anchor="ctr"/>
+          <a:lstStyle/>
+          <a:p>
+            <a:pPr/>
+          </a:p>
+        </p:txBody>
+      </p:sp>
+      <p:sp>
+        <p:nvSpPr>
+          <p:cNvPr id="351" name="Connection Line"/>
+          <p:cNvSpPr/>
+          <p:nvPr/>
+        </p:nvSpPr>
+        <p:spPr>
+          <a:xfrm>
+            <a:off x="5015767" y="2614440"/>
+            <a:ext cx="992567" cy="143975"/>
+          </a:xfrm>
+          <a:custGeom>
+            <a:avLst/>
+            <a:gdLst/>
+            <a:ahLst/>
+            <a:cxnLst>
+              <a:cxn ang="0">
+                <a:pos x="wd2" y="hd2"/>
+              </a:cxn>
+              <a:cxn ang="5400000">
+                <a:pos x="wd2" y="hd2"/>
+              </a:cxn>
+              <a:cxn ang="10800000">
+                <a:pos x="wd2" y="hd2"/>
+              </a:cxn>
+              <a:cxn ang="16200000">
+                <a:pos x="wd2" y="hd2"/>
+              </a:cxn>
+            </a:cxnLst>
+            <a:rect l="0" t="0" r="r" b="b"/>
+            <a:pathLst>
+              <a:path w="21600" h="16231" fill="norm" stroke="1" extrusionOk="0">
+                <a:moveTo>
+                  <a:pt x="0" y="2727"/>
+                </a:moveTo>
+                <a:cubicBezTo>
+                  <a:pt x="6228" y="21600"/>
+                  <a:pt x="13428" y="20691"/>
+                  <a:pt x="21600" y="0"/>
+                </a:cubicBezTo>
+              </a:path>
+            </a:pathLst>
+          </a:custGeom>
+          <a:ln w="25400">
+            <a:solidFill>
+              <a:schemeClr val="accent1"/>
+            </a:solidFill>
+          </a:ln>
+        </p:spPr>
+        <p:txBody>
+          <a:bodyPr/>
+          <a:lstStyle/>
+          <a:p>
+            <a:pPr/>
+          </a:p>
+        </p:txBody>
+      </p:sp>
+      <p:sp>
+        <p:nvSpPr>
+          <p:cNvPr id="346" name="Oval"/>
+          <p:cNvSpPr/>
+          <p:nvPr/>
+        </p:nvSpPr>
+        <p:spPr>
+          <a:xfrm>
+            <a:off x="6425364" y="3050807"/>
+            <a:ext cx="1004555" cy="317069"/>
+          </a:xfrm>
+          <a:prstGeom prst="ellipse">
+            <a:avLst/>
+          </a:prstGeom>
+          <a:ln w="25400">
+            <a:solidFill>
+              <a:schemeClr val="accent1">
+                <a:lumOff val="-6000"/>
+              </a:schemeClr>
+            </a:solidFill>
+          </a:ln>
+        </p:spPr>
+        <p:txBody>
+          <a:bodyPr lIns="46799" tIns="46799" rIns="46799" bIns="46799" anchor="ctr"/>
+          <a:lstStyle/>
+          <a:p>
+            <a:pPr/>
+          </a:p>
+        </p:txBody>
+      </p:sp>
+      <p:sp>
+        <p:nvSpPr>
+          <p:cNvPr id="347" name="Oval"/>
+          <p:cNvSpPr/>
+          <p:nvPr/>
+        </p:nvSpPr>
+        <p:spPr>
+          <a:xfrm>
+            <a:off x="6425364" y="1633212"/>
+            <a:ext cx="1004555" cy="317070"/>
+          </a:xfrm>
+          <a:prstGeom prst="ellipse">
+            <a:avLst/>
+          </a:prstGeom>
+          <a:ln w="25400">
+            <a:solidFill>
+              <a:schemeClr val="accent1">
+                <a:lumOff val="-6000"/>
+              </a:schemeClr>
+            </a:solidFill>
+          </a:ln>
+        </p:spPr>
+        <p:txBody>
+          <a:bodyPr lIns="46799" tIns="46799" rIns="46799" bIns="46799" anchor="ctr"/>
+          <a:lstStyle/>
+          <a:p>
+            <a:pPr/>
+          </a:p>
+        </p:txBody>
+      </p:sp>
+      <p:sp>
+        <p:nvSpPr>
+          <p:cNvPr id="348" name="Line"/>
+          <p:cNvSpPr/>
+          <p:nvPr/>
+        </p:nvSpPr>
+        <p:spPr>
+          <a:xfrm flipV="1">
+            <a:off x="6422603" y="1816971"/>
+            <a:ext cx="1" cy="1408658"/>
+          </a:xfrm>
+          <a:prstGeom prst="line">
+            <a:avLst/>
+          </a:prstGeom>
+          <a:ln w="25400">
+            <a:solidFill>
+              <a:schemeClr val="accent1">
+                <a:lumOff val="-6000"/>
+              </a:schemeClr>
+            </a:solidFill>
+          </a:ln>
+        </p:spPr>
+        <p:txBody>
+          <a:bodyPr lIns="45719" rIns="45719"/>
+          <a:lstStyle/>
+          <a:p>
+            <a:pPr/>
+          </a:p>
+        </p:txBody>
+      </p:sp>
+      <p:sp>
+        <p:nvSpPr>
+          <p:cNvPr id="349" name="Line"/>
+          <p:cNvSpPr/>
+          <p:nvPr/>
+        </p:nvSpPr>
+        <p:spPr>
+          <a:xfrm flipV="1">
+            <a:off x="7434874" y="1821773"/>
+            <a:ext cx="1" cy="1408657"/>
+          </a:xfrm>
+          <a:prstGeom prst="line">
+            <a:avLst/>
+          </a:prstGeom>
+          <a:ln w="25400">
+            <a:solidFill>
+              <a:schemeClr val="accent1">
+                <a:lumOff val="-6000"/>
+              </a:schemeClr>
+            </a:solidFill>
+          </a:ln>
+        </p:spPr>
+        <p:txBody>
+          <a:bodyPr lIns="45719" rIns="45719"/>
+          <a:lstStyle/>
+          <a:p>
+            <a:pPr/>
+          </a:p>
+        </p:txBody>
+      </p:sp>
+      <p:sp>
+        <p:nvSpPr>
+          <p:cNvPr id="350" name="Rectangle"/>
+          <p:cNvSpPr/>
+          <p:nvPr/>
+        </p:nvSpPr>
+        <p:spPr>
+          <a:xfrm>
+            <a:off x="6438665" y="2730739"/>
+            <a:ext cx="977952" cy="462005"/>
+          </a:xfrm>
+          <a:prstGeom prst="rect">
+            <a:avLst/>
+          </a:prstGeom>
+          <a:solidFill>
+            <a:srgbClr val="FFFFFF"/>
+          </a:solidFill>
+          <a:ln w="12700">
+            <a:miter lim="400000"/>
+          </a:ln>
+        </p:spPr>
+        <p:txBody>
+          <a:bodyPr lIns="46799" tIns="46799" rIns="46799" bIns="46799" anchor="ctr"/>
+          <a:lstStyle/>
+          <a:p>
+            <a:pPr/>
+          </a:p>
+        </p:txBody>
+      </p:sp>
     </p:spTree>
   </p:cSld>
   <p:clrMapOvr>

</xml_diff>